<commit_message>
working GP+ mroe rules
</commit_message>
<xml_diff>
--- a/hanabi (1).pptx
+++ b/hanabi (1).pptx
@@ -5,7 +5,7 @@
     <p:sldMasterId id="2147483696" r:id="rId1"/>
   </p:sldMasterIdLst>
   <p:notesMasterIdLst>
-    <p:notesMasterId r:id="rId11"/>
+    <p:notesMasterId r:id="rId12"/>
   </p:notesMasterIdLst>
   <p:sldIdLst>
     <p:sldId id="256" r:id="rId2"/>
@@ -17,6 +17,7 @@
     <p:sldId id="262" r:id="rId8"/>
     <p:sldId id="264" r:id="rId9"/>
     <p:sldId id="263" r:id="rId10"/>
+    <p:sldId id="266" r:id="rId11"/>
   </p:sldIdLst>
   <p:sldSz cx="9144000" cy="5143500" type="screen16x9"/>
   <p:notesSz cx="6858000" cy="9144000"/>
@@ -148,6 +149,2274 @@
 </p:presentation>
 </file>
 
+<file path=ppt/charts/chart1.xml><?xml version="1.0" encoding="utf-8"?>
+<c:chartSpace xmlns:c="http://schemas.openxmlformats.org/drawingml/2006/chart" xmlns:a="http://schemas.openxmlformats.org/drawingml/2006/main" xmlns:r="http://schemas.openxmlformats.org/officeDocument/2006/relationships" xmlns:c16r2="http://schemas.microsoft.com/office/drawing/2015/06/chart">
+  <c:date1904 val="0"/>
+  <c:lang val="en-US"/>
+  <c:roundedCorners val="0"/>
+  <mc:AlternateContent xmlns:mc="http://schemas.openxmlformats.org/markup-compatibility/2006">
+    <mc:Choice xmlns:c14="http://schemas.microsoft.com/office/drawing/2007/8/2/chart" Requires="c14">
+      <c14:style val="102"/>
+    </mc:Choice>
+    <mc:Fallback>
+      <c:style val="2"/>
+    </mc:Fallback>
+  </mc:AlternateContent>
+  <c:chart>
+    <c:title>
+      <c:tx>
+        <c:rich>
+          <a:bodyPr rot="0" spcFirstLastPara="1" vertOverflow="ellipsis" vert="horz" wrap="square" anchor="ctr" anchorCtr="1"/>
+          <a:lstStyle/>
+          <a:p>
+            <a:pPr>
+              <a:defRPr sz="1400" b="0" i="0" u="none" strike="noStrike" kern="1200" spc="0" baseline="0">
+                <a:solidFill>
+                  <a:schemeClr val="tx1">
+                    <a:lumMod val="65000"/>
+                    <a:lumOff val="35000"/>
+                  </a:schemeClr>
+                </a:solidFill>
+                <a:latin typeface="+mn-lt"/>
+                <a:ea typeface="+mn-ea"/>
+                <a:cs typeface="+mn-cs"/>
+              </a:defRPr>
+            </a:pPr>
+            <a:r>
+              <a:rPr lang="en-US" sz="1800"/>
+              <a:t>Fitness as a function of generations</a:t>
+            </a:r>
+          </a:p>
+        </c:rich>
+      </c:tx>
+      <c:layout/>
+      <c:overlay val="0"/>
+      <c:spPr>
+        <a:noFill/>
+        <a:ln>
+          <a:noFill/>
+        </a:ln>
+        <a:effectLst/>
+      </c:spPr>
+      <c:txPr>
+        <a:bodyPr rot="0" spcFirstLastPara="1" vertOverflow="ellipsis" vert="horz" wrap="square" anchor="ctr" anchorCtr="1"/>
+        <a:lstStyle/>
+        <a:p>
+          <a:pPr>
+            <a:defRPr sz="1400" b="0" i="0" u="none" strike="noStrike" kern="1200" spc="0" baseline="0">
+              <a:solidFill>
+                <a:schemeClr val="tx1">
+                  <a:lumMod val="65000"/>
+                  <a:lumOff val="35000"/>
+                </a:schemeClr>
+              </a:solidFill>
+              <a:latin typeface="+mn-lt"/>
+              <a:ea typeface="+mn-ea"/>
+              <a:cs typeface="+mn-cs"/>
+            </a:defRPr>
+          </a:pPr>
+          <a:endParaRPr lang="en-US"/>
+        </a:p>
+      </c:txPr>
+    </c:title>
+    <c:autoTitleDeleted val="0"/>
+    <c:plotArea>
+      <c:layout/>
+      <c:lineChart>
+        <c:grouping val="standard"/>
+        <c:varyColors val="0"/>
+        <c:ser>
+          <c:idx val="1"/>
+          <c:order val="1"/>
+          <c:tx>
+            <c:v>Avg_fitness</c:v>
+          </c:tx>
+          <c:spPr>
+            <a:ln w="28575" cap="rnd">
+              <a:solidFill>
+                <a:schemeClr val="accent2"/>
+              </a:solidFill>
+              <a:round/>
+            </a:ln>
+            <a:effectLst/>
+          </c:spPr>
+          <c:marker>
+            <c:symbol val="none"/>
+          </c:marker>
+          <c:val>
+            <c:numRef>
+              <c:f>Sheet1!$C$2:$C$102</c:f>
+              <c:numCache>
+                <c:formatCode>General</c:formatCode>
+                <c:ptCount val="101"/>
+                <c:pt idx="0">
+                  <c:v>0.58333299999999999</c:v>
+                </c:pt>
+                <c:pt idx="1">
+                  <c:v>1.4</c:v>
+                </c:pt>
+                <c:pt idx="2">
+                  <c:v>1.4666699999999999</c:v>
+                </c:pt>
+                <c:pt idx="3">
+                  <c:v>1.51667</c:v>
+                </c:pt>
+                <c:pt idx="4">
+                  <c:v>1.3333299999999999</c:v>
+                </c:pt>
+                <c:pt idx="5">
+                  <c:v>1.7833300000000001</c:v>
+                </c:pt>
+                <c:pt idx="6">
+                  <c:v>1.2166699999999999</c:v>
+                </c:pt>
+                <c:pt idx="7">
+                  <c:v>1.48333</c:v>
+                </c:pt>
+                <c:pt idx="8">
+                  <c:v>1.23333</c:v>
+                </c:pt>
+                <c:pt idx="9">
+                  <c:v>1.55</c:v>
+                </c:pt>
+                <c:pt idx="10">
+                  <c:v>2.5</c:v>
+                </c:pt>
+                <c:pt idx="11">
+                  <c:v>3.2166700000000001</c:v>
+                </c:pt>
+                <c:pt idx="12">
+                  <c:v>3.9333300000000002</c:v>
+                </c:pt>
+                <c:pt idx="13">
+                  <c:v>5.3166700000000002</c:v>
+                </c:pt>
+                <c:pt idx="14">
+                  <c:v>6.3</c:v>
+                </c:pt>
+                <c:pt idx="15">
+                  <c:v>8.2166700000000006</c:v>
+                </c:pt>
+                <c:pt idx="16">
+                  <c:v>7.4833299999999996</c:v>
+                </c:pt>
+                <c:pt idx="17">
+                  <c:v>7.7166699999999997</c:v>
+                </c:pt>
+                <c:pt idx="18">
+                  <c:v>10.1</c:v>
+                </c:pt>
+                <c:pt idx="19">
+                  <c:v>8.7666699999999995</c:v>
+                </c:pt>
+                <c:pt idx="20">
+                  <c:v>9.1</c:v>
+                </c:pt>
+                <c:pt idx="21">
+                  <c:v>8.4499999999999993</c:v>
+                </c:pt>
+                <c:pt idx="22">
+                  <c:v>8.8666699999999992</c:v>
+                </c:pt>
+                <c:pt idx="23">
+                  <c:v>11.1333</c:v>
+                </c:pt>
+                <c:pt idx="24">
+                  <c:v>9.8666699999999992</c:v>
+                </c:pt>
+                <c:pt idx="25">
+                  <c:v>10.066700000000001</c:v>
+                </c:pt>
+                <c:pt idx="26">
+                  <c:v>10.083299999999999</c:v>
+                </c:pt>
+                <c:pt idx="27">
+                  <c:v>10.85</c:v>
+                </c:pt>
+                <c:pt idx="28">
+                  <c:v>10.199999999999999</c:v>
+                </c:pt>
+                <c:pt idx="29">
+                  <c:v>9.4</c:v>
+                </c:pt>
+                <c:pt idx="30">
+                  <c:v>11.65</c:v>
+                </c:pt>
+                <c:pt idx="31">
+                  <c:v>9.5500000000000007</c:v>
+                </c:pt>
+                <c:pt idx="32">
+                  <c:v>9.6833299999999998</c:v>
+                </c:pt>
+                <c:pt idx="33">
+                  <c:v>11.05</c:v>
+                </c:pt>
+                <c:pt idx="34">
+                  <c:v>11.083299999999999</c:v>
+                </c:pt>
+                <c:pt idx="35">
+                  <c:v>10.033300000000001</c:v>
+                </c:pt>
+                <c:pt idx="36">
+                  <c:v>11.916700000000001</c:v>
+                </c:pt>
+                <c:pt idx="37">
+                  <c:v>8.9833300000000005</c:v>
+                </c:pt>
+                <c:pt idx="38">
+                  <c:v>10.3</c:v>
+                </c:pt>
+                <c:pt idx="39">
+                  <c:v>11.8833</c:v>
+                </c:pt>
+                <c:pt idx="40">
+                  <c:v>11.8</c:v>
+                </c:pt>
+                <c:pt idx="41">
+                  <c:v>9.8166700000000002</c:v>
+                </c:pt>
+                <c:pt idx="42">
+                  <c:v>11.966699999999999</c:v>
+                </c:pt>
+                <c:pt idx="43">
+                  <c:v>10</c:v>
+                </c:pt>
+                <c:pt idx="44">
+                  <c:v>10.316700000000001</c:v>
+                </c:pt>
+                <c:pt idx="45">
+                  <c:v>11.533300000000001</c:v>
+                </c:pt>
+                <c:pt idx="46">
+                  <c:v>10.45</c:v>
+                </c:pt>
+                <c:pt idx="47">
+                  <c:v>11.066700000000001</c:v>
+                </c:pt>
+                <c:pt idx="48">
+                  <c:v>11.683299999999999</c:v>
+                </c:pt>
+                <c:pt idx="49">
+                  <c:v>11</c:v>
+                </c:pt>
+                <c:pt idx="50">
+                  <c:v>12.0167</c:v>
+                </c:pt>
+                <c:pt idx="51">
+                  <c:v>9.75</c:v>
+                </c:pt>
+                <c:pt idx="52">
+                  <c:v>11.35</c:v>
+                </c:pt>
+                <c:pt idx="53">
+                  <c:v>9.65</c:v>
+                </c:pt>
+                <c:pt idx="54">
+                  <c:v>11.8833</c:v>
+                </c:pt>
+                <c:pt idx="55">
+                  <c:v>10.7</c:v>
+                </c:pt>
+                <c:pt idx="56">
+                  <c:v>11.9833</c:v>
+                </c:pt>
+                <c:pt idx="57">
+                  <c:v>10.916700000000001</c:v>
+                </c:pt>
+                <c:pt idx="58">
+                  <c:v>11.033300000000001</c:v>
+                </c:pt>
+                <c:pt idx="59">
+                  <c:v>10.8833</c:v>
+                </c:pt>
+                <c:pt idx="60">
+                  <c:v>11.6167</c:v>
+                </c:pt>
+                <c:pt idx="61">
+                  <c:v>12.3667</c:v>
+                </c:pt>
+                <c:pt idx="62">
+                  <c:v>10.0167</c:v>
+                </c:pt>
+                <c:pt idx="63">
+                  <c:v>13.666700000000001</c:v>
+                </c:pt>
+                <c:pt idx="64">
+                  <c:v>12.2</c:v>
+                </c:pt>
+                <c:pt idx="65">
+                  <c:v>11.0167</c:v>
+                </c:pt>
+                <c:pt idx="66">
+                  <c:v>10.666700000000001</c:v>
+                </c:pt>
+                <c:pt idx="67">
+                  <c:v>11.033300000000001</c:v>
+                </c:pt>
+                <c:pt idx="68">
+                  <c:v>11.933299999999999</c:v>
+                </c:pt>
+                <c:pt idx="69">
+                  <c:v>10.9833</c:v>
+                </c:pt>
+                <c:pt idx="70">
+                  <c:v>11.333299999999999</c:v>
+                </c:pt>
+                <c:pt idx="71">
+                  <c:v>10.283300000000001</c:v>
+                </c:pt>
+                <c:pt idx="72">
+                  <c:v>11.316700000000001</c:v>
+                </c:pt>
+                <c:pt idx="73">
+                  <c:v>10.316700000000001</c:v>
+                </c:pt>
+                <c:pt idx="74">
+                  <c:v>10.5167</c:v>
+                </c:pt>
+                <c:pt idx="75">
+                  <c:v>12.0167</c:v>
+                </c:pt>
+                <c:pt idx="76">
+                  <c:v>11.316700000000001</c:v>
+                </c:pt>
+                <c:pt idx="77">
+                  <c:v>10.15</c:v>
+                </c:pt>
+                <c:pt idx="78">
+                  <c:v>11.25</c:v>
+                </c:pt>
+                <c:pt idx="79">
+                  <c:v>12.35</c:v>
+                </c:pt>
+                <c:pt idx="80">
+                  <c:v>13.033300000000001</c:v>
+                </c:pt>
+                <c:pt idx="81">
+                  <c:v>11.716699999999999</c:v>
+                </c:pt>
+                <c:pt idx="82">
+                  <c:v>11.466699999999999</c:v>
+                </c:pt>
+                <c:pt idx="83">
+                  <c:v>11.333299999999999</c:v>
+                </c:pt>
+                <c:pt idx="84">
+                  <c:v>12.083299999999999</c:v>
+                </c:pt>
+                <c:pt idx="85">
+                  <c:v>11.95</c:v>
+                </c:pt>
+                <c:pt idx="86">
+                  <c:v>11.1167</c:v>
+                </c:pt>
+                <c:pt idx="87">
+                  <c:v>11.5</c:v>
+                </c:pt>
+                <c:pt idx="88">
+                  <c:v>11.35</c:v>
+                </c:pt>
+                <c:pt idx="89">
+                  <c:v>11.4</c:v>
+                </c:pt>
+                <c:pt idx="90">
+                  <c:v>11.6333</c:v>
+                </c:pt>
+                <c:pt idx="91">
+                  <c:v>12.55</c:v>
+                </c:pt>
+                <c:pt idx="92">
+                  <c:v>11.933299999999999</c:v>
+                </c:pt>
+                <c:pt idx="93">
+                  <c:v>9.5666700000000002</c:v>
+                </c:pt>
+                <c:pt idx="94">
+                  <c:v>10.033300000000001</c:v>
+                </c:pt>
+                <c:pt idx="95">
+                  <c:v>11.4</c:v>
+                </c:pt>
+                <c:pt idx="96">
+                  <c:v>11.9</c:v>
+                </c:pt>
+                <c:pt idx="97">
+                  <c:v>9.6166699999999992</c:v>
+                </c:pt>
+                <c:pt idx="98">
+                  <c:v>11.2</c:v>
+                </c:pt>
+                <c:pt idx="99">
+                  <c:v>12.316700000000001</c:v>
+                </c:pt>
+                <c:pt idx="100">
+                  <c:v>10.683299999999999</c:v>
+                </c:pt>
+              </c:numCache>
+            </c:numRef>
+          </c:val>
+          <c:smooth val="0"/>
+          <c:extLst>
+            <c:ext xmlns:c16="http://schemas.microsoft.com/office/drawing/2014/chart" uri="{C3380CC4-5D6E-409C-BE32-E72D297353CC}">
+              <c16:uniqueId val="{00000000-3437-45D7-AF20-005D115F4F58}"/>
+            </c:ext>
+          </c:extLst>
+        </c:ser>
+        <c:ser>
+          <c:idx val="2"/>
+          <c:order val="2"/>
+          <c:tx>
+            <c:v>Max_score</c:v>
+          </c:tx>
+          <c:spPr>
+            <a:ln w="28575" cap="rnd">
+              <a:solidFill>
+                <a:schemeClr val="accent3"/>
+              </a:solidFill>
+              <a:round/>
+            </a:ln>
+            <a:effectLst/>
+          </c:spPr>
+          <c:marker>
+            <c:symbol val="none"/>
+          </c:marker>
+          <c:val>
+            <c:numRef>
+              <c:f>Sheet1!$F$2:$F$102</c:f>
+              <c:numCache>
+                <c:formatCode>General</c:formatCode>
+                <c:ptCount val="101"/>
+                <c:pt idx="0">
+                  <c:v>4.5</c:v>
+                </c:pt>
+                <c:pt idx="1">
+                  <c:v>4</c:v>
+                </c:pt>
+                <c:pt idx="2">
+                  <c:v>3.5</c:v>
+                </c:pt>
+                <c:pt idx="3">
+                  <c:v>5</c:v>
+                </c:pt>
+                <c:pt idx="4">
+                  <c:v>4</c:v>
+                </c:pt>
+                <c:pt idx="5">
+                  <c:v>4.5</c:v>
+                </c:pt>
+                <c:pt idx="6">
+                  <c:v>4.5</c:v>
+                </c:pt>
+                <c:pt idx="7">
+                  <c:v>3.5</c:v>
+                </c:pt>
+                <c:pt idx="8">
+                  <c:v>5</c:v>
+                </c:pt>
+                <c:pt idx="9">
+                  <c:v>4.5</c:v>
+                </c:pt>
+                <c:pt idx="10">
+                  <c:v>8.5</c:v>
+                </c:pt>
+                <c:pt idx="11">
+                  <c:v>10</c:v>
+                </c:pt>
+                <c:pt idx="12">
+                  <c:v>11.5</c:v>
+                </c:pt>
+                <c:pt idx="13">
+                  <c:v>15</c:v>
+                </c:pt>
+                <c:pt idx="14">
+                  <c:v>15</c:v>
+                </c:pt>
+                <c:pt idx="15">
+                  <c:v>15.5</c:v>
+                </c:pt>
+                <c:pt idx="16">
+                  <c:v>14</c:v>
+                </c:pt>
+                <c:pt idx="17">
+                  <c:v>16</c:v>
+                </c:pt>
+                <c:pt idx="18">
+                  <c:v>17</c:v>
+                </c:pt>
+                <c:pt idx="19">
+                  <c:v>16</c:v>
+                </c:pt>
+                <c:pt idx="20">
+                  <c:v>15</c:v>
+                </c:pt>
+                <c:pt idx="21">
+                  <c:v>15.5</c:v>
+                </c:pt>
+                <c:pt idx="22">
+                  <c:v>18.5</c:v>
+                </c:pt>
+                <c:pt idx="23">
+                  <c:v>18.5</c:v>
+                </c:pt>
+                <c:pt idx="24">
+                  <c:v>16.5</c:v>
+                </c:pt>
+                <c:pt idx="25">
+                  <c:v>16.5</c:v>
+                </c:pt>
+                <c:pt idx="26">
+                  <c:v>16.5</c:v>
+                </c:pt>
+                <c:pt idx="27">
+                  <c:v>16.5</c:v>
+                </c:pt>
+                <c:pt idx="28">
+                  <c:v>17</c:v>
+                </c:pt>
+                <c:pt idx="29">
+                  <c:v>16</c:v>
+                </c:pt>
+                <c:pt idx="30">
+                  <c:v>16.5</c:v>
+                </c:pt>
+                <c:pt idx="31">
+                  <c:v>16</c:v>
+                </c:pt>
+                <c:pt idx="32">
+                  <c:v>15</c:v>
+                </c:pt>
+                <c:pt idx="33">
+                  <c:v>16</c:v>
+                </c:pt>
+                <c:pt idx="34">
+                  <c:v>16</c:v>
+                </c:pt>
+                <c:pt idx="35">
+                  <c:v>16</c:v>
+                </c:pt>
+                <c:pt idx="36">
+                  <c:v>16.5</c:v>
+                </c:pt>
+                <c:pt idx="37">
+                  <c:v>17.5</c:v>
+                </c:pt>
+                <c:pt idx="38">
+                  <c:v>17.5</c:v>
+                </c:pt>
+                <c:pt idx="39">
+                  <c:v>17.5</c:v>
+                </c:pt>
+                <c:pt idx="40">
+                  <c:v>17.5</c:v>
+                </c:pt>
+                <c:pt idx="41">
+                  <c:v>15.5</c:v>
+                </c:pt>
+                <c:pt idx="42">
+                  <c:v>17</c:v>
+                </c:pt>
+                <c:pt idx="43">
+                  <c:v>16</c:v>
+                </c:pt>
+                <c:pt idx="44">
+                  <c:v>16.5</c:v>
+                </c:pt>
+                <c:pt idx="45">
+                  <c:v>16</c:v>
+                </c:pt>
+                <c:pt idx="46">
+                  <c:v>18</c:v>
+                </c:pt>
+                <c:pt idx="47">
+                  <c:v>17</c:v>
+                </c:pt>
+                <c:pt idx="48">
+                  <c:v>16.5</c:v>
+                </c:pt>
+                <c:pt idx="49">
+                  <c:v>16</c:v>
+                </c:pt>
+                <c:pt idx="50">
+                  <c:v>17</c:v>
+                </c:pt>
+                <c:pt idx="51">
+                  <c:v>17</c:v>
+                </c:pt>
+                <c:pt idx="52">
+                  <c:v>17</c:v>
+                </c:pt>
+                <c:pt idx="53">
+                  <c:v>17</c:v>
+                </c:pt>
+                <c:pt idx="54">
+                  <c:v>17</c:v>
+                </c:pt>
+                <c:pt idx="55">
+                  <c:v>16</c:v>
+                </c:pt>
+                <c:pt idx="56">
+                  <c:v>17</c:v>
+                </c:pt>
+                <c:pt idx="57">
+                  <c:v>17</c:v>
+                </c:pt>
+                <c:pt idx="58">
+                  <c:v>16.5</c:v>
+                </c:pt>
+                <c:pt idx="59">
+                  <c:v>16.5</c:v>
+                </c:pt>
+                <c:pt idx="60">
+                  <c:v>16.5</c:v>
+                </c:pt>
+                <c:pt idx="61">
+                  <c:v>16.5</c:v>
+                </c:pt>
+                <c:pt idx="62">
+                  <c:v>16.5</c:v>
+                </c:pt>
+                <c:pt idx="63">
+                  <c:v>17</c:v>
+                </c:pt>
+                <c:pt idx="64">
+                  <c:v>16.5</c:v>
+                </c:pt>
+                <c:pt idx="65">
+                  <c:v>16.5</c:v>
+                </c:pt>
+                <c:pt idx="66">
+                  <c:v>15.5</c:v>
+                </c:pt>
+                <c:pt idx="67">
+                  <c:v>18.5</c:v>
+                </c:pt>
+                <c:pt idx="68">
+                  <c:v>19</c:v>
+                </c:pt>
+                <c:pt idx="69">
+                  <c:v>17.5</c:v>
+                </c:pt>
+                <c:pt idx="70">
+                  <c:v>18</c:v>
+                </c:pt>
+                <c:pt idx="71">
+                  <c:v>16</c:v>
+                </c:pt>
+                <c:pt idx="72">
+                  <c:v>16</c:v>
+                </c:pt>
+                <c:pt idx="73">
+                  <c:v>16</c:v>
+                </c:pt>
+                <c:pt idx="74">
+                  <c:v>16</c:v>
+                </c:pt>
+                <c:pt idx="75">
+                  <c:v>15.5</c:v>
+                </c:pt>
+                <c:pt idx="76">
+                  <c:v>15.5</c:v>
+                </c:pt>
+                <c:pt idx="77">
+                  <c:v>15.5</c:v>
+                </c:pt>
+                <c:pt idx="78">
+                  <c:v>17.5</c:v>
+                </c:pt>
+                <c:pt idx="79">
+                  <c:v>17.5</c:v>
+                </c:pt>
+                <c:pt idx="80">
+                  <c:v>17.5</c:v>
+                </c:pt>
+                <c:pt idx="81">
+                  <c:v>17.5</c:v>
+                </c:pt>
+                <c:pt idx="82">
+                  <c:v>16.5</c:v>
+                </c:pt>
+                <c:pt idx="83">
+                  <c:v>16.5</c:v>
+                </c:pt>
+                <c:pt idx="84">
+                  <c:v>17</c:v>
+                </c:pt>
+                <c:pt idx="85">
+                  <c:v>17</c:v>
+                </c:pt>
+                <c:pt idx="86">
+                  <c:v>17</c:v>
+                </c:pt>
+                <c:pt idx="87">
+                  <c:v>17</c:v>
+                </c:pt>
+                <c:pt idx="88">
+                  <c:v>15.5</c:v>
+                </c:pt>
+                <c:pt idx="89">
+                  <c:v>16</c:v>
+                </c:pt>
+                <c:pt idx="90">
+                  <c:v>16.5</c:v>
+                </c:pt>
+                <c:pt idx="91">
+                  <c:v>16.5</c:v>
+                </c:pt>
+                <c:pt idx="92">
+                  <c:v>17</c:v>
+                </c:pt>
+                <c:pt idx="93">
+                  <c:v>17</c:v>
+                </c:pt>
+                <c:pt idx="94">
+                  <c:v>15.5</c:v>
+                </c:pt>
+                <c:pt idx="95">
+                  <c:v>15.5</c:v>
+                </c:pt>
+                <c:pt idx="96">
+                  <c:v>15.5</c:v>
+                </c:pt>
+                <c:pt idx="97">
+                  <c:v>15</c:v>
+                </c:pt>
+                <c:pt idx="98">
+                  <c:v>16.5</c:v>
+                </c:pt>
+                <c:pt idx="99">
+                  <c:v>16.5</c:v>
+                </c:pt>
+                <c:pt idx="100">
+                  <c:v>15.5</c:v>
+                </c:pt>
+              </c:numCache>
+            </c:numRef>
+          </c:val>
+          <c:smooth val="0"/>
+          <c:extLst>
+            <c:ext xmlns:c16="http://schemas.microsoft.com/office/drawing/2014/chart" uri="{C3380CC4-5D6E-409C-BE32-E72D297353CC}">
+              <c16:uniqueId val="{00000001-3437-45D7-AF20-005D115F4F58}"/>
+            </c:ext>
+          </c:extLst>
+        </c:ser>
+        <c:dLbls>
+          <c:showLegendKey val="0"/>
+          <c:showVal val="0"/>
+          <c:showCatName val="0"/>
+          <c:showSerName val="0"/>
+          <c:showPercent val="0"/>
+          <c:showBubbleSize val="0"/>
+        </c:dLbls>
+        <c:smooth val="0"/>
+        <c:axId val="394856799"/>
+        <c:axId val="394857215"/>
+        <c:extLst>
+          <c:ext xmlns:c15="http://schemas.microsoft.com/office/drawing/2012/chart" uri="{02D57815-91ED-43cb-92C2-25804820EDAC}">
+            <c15:filteredLineSeries>
+              <c15:ser>
+                <c:idx val="0"/>
+                <c:order val="0"/>
+                <c:tx>
+                  <c:strRef>
+                    <c:extLst>
+                      <c:ext uri="{02D57815-91ED-43cb-92C2-25804820EDAC}">
+                        <c15:formulaRef>
+                          <c15:sqref>Sheet1!$A$2:$A$102</c15:sqref>
+                        </c15:formulaRef>
+                      </c:ext>
+                    </c:extLst>
+                    <c:strCache>
+                      <c:ptCount val="101"/>
+                      <c:pt idx="0">
+                        <c:v>0</c:v>
+                      </c:pt>
+                      <c:pt idx="1">
+                        <c:v>1</c:v>
+                      </c:pt>
+                      <c:pt idx="2">
+                        <c:v>2</c:v>
+                      </c:pt>
+                      <c:pt idx="3">
+                        <c:v>3</c:v>
+                      </c:pt>
+                      <c:pt idx="4">
+                        <c:v>4</c:v>
+                      </c:pt>
+                      <c:pt idx="5">
+                        <c:v>5</c:v>
+                      </c:pt>
+                      <c:pt idx="6">
+                        <c:v>6</c:v>
+                      </c:pt>
+                      <c:pt idx="7">
+                        <c:v>7</c:v>
+                      </c:pt>
+                      <c:pt idx="8">
+                        <c:v>8</c:v>
+                      </c:pt>
+                      <c:pt idx="9">
+                        <c:v>9</c:v>
+                      </c:pt>
+                      <c:pt idx="10">
+                        <c:v>10</c:v>
+                      </c:pt>
+                      <c:pt idx="11">
+                        <c:v>11</c:v>
+                      </c:pt>
+                      <c:pt idx="12">
+                        <c:v>12</c:v>
+                      </c:pt>
+                      <c:pt idx="13">
+                        <c:v>13</c:v>
+                      </c:pt>
+                      <c:pt idx="14">
+                        <c:v>14</c:v>
+                      </c:pt>
+                      <c:pt idx="15">
+                        <c:v>15</c:v>
+                      </c:pt>
+                      <c:pt idx="16">
+                        <c:v>16</c:v>
+                      </c:pt>
+                      <c:pt idx="17">
+                        <c:v>17</c:v>
+                      </c:pt>
+                      <c:pt idx="18">
+                        <c:v>18</c:v>
+                      </c:pt>
+                      <c:pt idx="19">
+                        <c:v>19</c:v>
+                      </c:pt>
+                      <c:pt idx="20">
+                        <c:v>20</c:v>
+                      </c:pt>
+                      <c:pt idx="21">
+                        <c:v>21</c:v>
+                      </c:pt>
+                      <c:pt idx="22">
+                        <c:v>22</c:v>
+                      </c:pt>
+                      <c:pt idx="23">
+                        <c:v>23</c:v>
+                      </c:pt>
+                      <c:pt idx="24">
+                        <c:v>24</c:v>
+                      </c:pt>
+                      <c:pt idx="25">
+                        <c:v>25</c:v>
+                      </c:pt>
+                      <c:pt idx="26">
+                        <c:v>26</c:v>
+                      </c:pt>
+                      <c:pt idx="27">
+                        <c:v>27</c:v>
+                      </c:pt>
+                      <c:pt idx="28">
+                        <c:v>28</c:v>
+                      </c:pt>
+                      <c:pt idx="29">
+                        <c:v>29</c:v>
+                      </c:pt>
+                      <c:pt idx="30">
+                        <c:v>30</c:v>
+                      </c:pt>
+                      <c:pt idx="31">
+                        <c:v>31</c:v>
+                      </c:pt>
+                      <c:pt idx="32">
+                        <c:v>32</c:v>
+                      </c:pt>
+                      <c:pt idx="33">
+                        <c:v>33</c:v>
+                      </c:pt>
+                      <c:pt idx="34">
+                        <c:v>34</c:v>
+                      </c:pt>
+                      <c:pt idx="35">
+                        <c:v>35</c:v>
+                      </c:pt>
+                      <c:pt idx="36">
+                        <c:v>36</c:v>
+                      </c:pt>
+                      <c:pt idx="37">
+                        <c:v>37</c:v>
+                      </c:pt>
+                      <c:pt idx="38">
+                        <c:v>38</c:v>
+                      </c:pt>
+                      <c:pt idx="39">
+                        <c:v>39</c:v>
+                      </c:pt>
+                      <c:pt idx="40">
+                        <c:v>40</c:v>
+                      </c:pt>
+                      <c:pt idx="41">
+                        <c:v>41</c:v>
+                      </c:pt>
+                      <c:pt idx="42">
+                        <c:v>42</c:v>
+                      </c:pt>
+                      <c:pt idx="43">
+                        <c:v>43</c:v>
+                      </c:pt>
+                      <c:pt idx="44">
+                        <c:v>44</c:v>
+                      </c:pt>
+                      <c:pt idx="45">
+                        <c:v>45</c:v>
+                      </c:pt>
+                      <c:pt idx="46">
+                        <c:v>46</c:v>
+                      </c:pt>
+                      <c:pt idx="47">
+                        <c:v>47</c:v>
+                      </c:pt>
+                      <c:pt idx="48">
+                        <c:v>48</c:v>
+                      </c:pt>
+                      <c:pt idx="49">
+                        <c:v>49</c:v>
+                      </c:pt>
+                      <c:pt idx="50">
+                        <c:v>50</c:v>
+                      </c:pt>
+                      <c:pt idx="51">
+                        <c:v>51</c:v>
+                      </c:pt>
+                      <c:pt idx="52">
+                        <c:v>52</c:v>
+                      </c:pt>
+                      <c:pt idx="53">
+                        <c:v>53</c:v>
+                      </c:pt>
+                      <c:pt idx="54">
+                        <c:v>54</c:v>
+                      </c:pt>
+                      <c:pt idx="55">
+                        <c:v>55</c:v>
+                      </c:pt>
+                      <c:pt idx="56">
+                        <c:v>56</c:v>
+                      </c:pt>
+                      <c:pt idx="57">
+                        <c:v>57</c:v>
+                      </c:pt>
+                      <c:pt idx="58">
+                        <c:v>58</c:v>
+                      </c:pt>
+                      <c:pt idx="59">
+                        <c:v>59</c:v>
+                      </c:pt>
+                      <c:pt idx="60">
+                        <c:v>60</c:v>
+                      </c:pt>
+                      <c:pt idx="61">
+                        <c:v>61</c:v>
+                      </c:pt>
+                      <c:pt idx="62">
+                        <c:v>62</c:v>
+                      </c:pt>
+                      <c:pt idx="63">
+                        <c:v>63</c:v>
+                      </c:pt>
+                      <c:pt idx="64">
+                        <c:v>64</c:v>
+                      </c:pt>
+                      <c:pt idx="65">
+                        <c:v>65</c:v>
+                      </c:pt>
+                      <c:pt idx="66">
+                        <c:v>66</c:v>
+                      </c:pt>
+                      <c:pt idx="67">
+                        <c:v>67</c:v>
+                      </c:pt>
+                      <c:pt idx="68">
+                        <c:v>68</c:v>
+                      </c:pt>
+                      <c:pt idx="69">
+                        <c:v>69</c:v>
+                      </c:pt>
+                      <c:pt idx="70">
+                        <c:v>70</c:v>
+                      </c:pt>
+                      <c:pt idx="71">
+                        <c:v>71</c:v>
+                      </c:pt>
+                      <c:pt idx="72">
+                        <c:v>72</c:v>
+                      </c:pt>
+                      <c:pt idx="73">
+                        <c:v>73</c:v>
+                      </c:pt>
+                      <c:pt idx="74">
+                        <c:v>74</c:v>
+                      </c:pt>
+                      <c:pt idx="75">
+                        <c:v>75</c:v>
+                      </c:pt>
+                      <c:pt idx="76">
+                        <c:v>76</c:v>
+                      </c:pt>
+                      <c:pt idx="77">
+                        <c:v>77</c:v>
+                      </c:pt>
+                      <c:pt idx="78">
+                        <c:v>78</c:v>
+                      </c:pt>
+                      <c:pt idx="79">
+                        <c:v>79</c:v>
+                      </c:pt>
+                      <c:pt idx="80">
+                        <c:v>80</c:v>
+                      </c:pt>
+                      <c:pt idx="81">
+                        <c:v>81</c:v>
+                      </c:pt>
+                      <c:pt idx="82">
+                        <c:v>82</c:v>
+                      </c:pt>
+                      <c:pt idx="83">
+                        <c:v>83</c:v>
+                      </c:pt>
+                      <c:pt idx="84">
+                        <c:v>84</c:v>
+                      </c:pt>
+                      <c:pt idx="85">
+                        <c:v>85</c:v>
+                      </c:pt>
+                      <c:pt idx="86">
+                        <c:v>86</c:v>
+                      </c:pt>
+                      <c:pt idx="87">
+                        <c:v>87</c:v>
+                      </c:pt>
+                      <c:pt idx="88">
+                        <c:v>88</c:v>
+                      </c:pt>
+                      <c:pt idx="89">
+                        <c:v>89</c:v>
+                      </c:pt>
+                      <c:pt idx="90">
+                        <c:v>90</c:v>
+                      </c:pt>
+                      <c:pt idx="91">
+                        <c:v>91</c:v>
+                      </c:pt>
+                      <c:pt idx="92">
+                        <c:v>92</c:v>
+                      </c:pt>
+                      <c:pt idx="93">
+                        <c:v>93</c:v>
+                      </c:pt>
+                      <c:pt idx="94">
+                        <c:v>94</c:v>
+                      </c:pt>
+                      <c:pt idx="95">
+                        <c:v>95</c:v>
+                      </c:pt>
+                      <c:pt idx="96">
+                        <c:v>96</c:v>
+                      </c:pt>
+                      <c:pt idx="97">
+                        <c:v>97</c:v>
+                      </c:pt>
+                      <c:pt idx="98">
+                        <c:v>98</c:v>
+                      </c:pt>
+                      <c:pt idx="99">
+                        <c:v>99</c:v>
+                      </c:pt>
+                      <c:pt idx="100">
+                        <c:v>100</c:v>
+                      </c:pt>
+                    </c:strCache>
+                  </c:strRef>
+                </c:tx>
+                <c:spPr>
+                  <a:ln w="28575" cap="rnd">
+                    <a:solidFill>
+                      <a:schemeClr val="accent1"/>
+                    </a:solidFill>
+                    <a:round/>
+                  </a:ln>
+                  <a:effectLst/>
+                </c:spPr>
+                <c:marker>
+                  <c:symbol val="none"/>
+                </c:marker>
+                <c:val>
+                  <c:numRef>
+                    <c:extLst>
+                      <c:ext uri="{02D57815-91ED-43cb-92C2-25804820EDAC}">
+                        <c15:formulaRef>
+                          <c15:sqref>Sheet1!$A$2:$A$102</c15:sqref>
+                        </c15:formulaRef>
+                      </c:ext>
+                    </c:extLst>
+                    <c:numCache>
+                      <c:formatCode>General</c:formatCode>
+                      <c:ptCount val="101"/>
+                      <c:pt idx="0">
+                        <c:v>0</c:v>
+                      </c:pt>
+                      <c:pt idx="1">
+                        <c:v>1</c:v>
+                      </c:pt>
+                      <c:pt idx="2">
+                        <c:v>2</c:v>
+                      </c:pt>
+                      <c:pt idx="3">
+                        <c:v>3</c:v>
+                      </c:pt>
+                      <c:pt idx="4">
+                        <c:v>4</c:v>
+                      </c:pt>
+                      <c:pt idx="5">
+                        <c:v>5</c:v>
+                      </c:pt>
+                      <c:pt idx="6">
+                        <c:v>6</c:v>
+                      </c:pt>
+                      <c:pt idx="7">
+                        <c:v>7</c:v>
+                      </c:pt>
+                      <c:pt idx="8">
+                        <c:v>8</c:v>
+                      </c:pt>
+                      <c:pt idx="9">
+                        <c:v>9</c:v>
+                      </c:pt>
+                      <c:pt idx="10">
+                        <c:v>10</c:v>
+                      </c:pt>
+                      <c:pt idx="11">
+                        <c:v>11</c:v>
+                      </c:pt>
+                      <c:pt idx="12">
+                        <c:v>12</c:v>
+                      </c:pt>
+                      <c:pt idx="13">
+                        <c:v>13</c:v>
+                      </c:pt>
+                      <c:pt idx="14">
+                        <c:v>14</c:v>
+                      </c:pt>
+                      <c:pt idx="15">
+                        <c:v>15</c:v>
+                      </c:pt>
+                      <c:pt idx="16">
+                        <c:v>16</c:v>
+                      </c:pt>
+                      <c:pt idx="17">
+                        <c:v>17</c:v>
+                      </c:pt>
+                      <c:pt idx="18">
+                        <c:v>18</c:v>
+                      </c:pt>
+                      <c:pt idx="19">
+                        <c:v>19</c:v>
+                      </c:pt>
+                      <c:pt idx="20">
+                        <c:v>20</c:v>
+                      </c:pt>
+                      <c:pt idx="21">
+                        <c:v>21</c:v>
+                      </c:pt>
+                      <c:pt idx="22">
+                        <c:v>22</c:v>
+                      </c:pt>
+                      <c:pt idx="23">
+                        <c:v>23</c:v>
+                      </c:pt>
+                      <c:pt idx="24">
+                        <c:v>24</c:v>
+                      </c:pt>
+                      <c:pt idx="25">
+                        <c:v>25</c:v>
+                      </c:pt>
+                      <c:pt idx="26">
+                        <c:v>26</c:v>
+                      </c:pt>
+                      <c:pt idx="27">
+                        <c:v>27</c:v>
+                      </c:pt>
+                      <c:pt idx="28">
+                        <c:v>28</c:v>
+                      </c:pt>
+                      <c:pt idx="29">
+                        <c:v>29</c:v>
+                      </c:pt>
+                      <c:pt idx="30">
+                        <c:v>30</c:v>
+                      </c:pt>
+                      <c:pt idx="31">
+                        <c:v>31</c:v>
+                      </c:pt>
+                      <c:pt idx="32">
+                        <c:v>32</c:v>
+                      </c:pt>
+                      <c:pt idx="33">
+                        <c:v>33</c:v>
+                      </c:pt>
+                      <c:pt idx="34">
+                        <c:v>34</c:v>
+                      </c:pt>
+                      <c:pt idx="35">
+                        <c:v>35</c:v>
+                      </c:pt>
+                      <c:pt idx="36">
+                        <c:v>36</c:v>
+                      </c:pt>
+                      <c:pt idx="37">
+                        <c:v>37</c:v>
+                      </c:pt>
+                      <c:pt idx="38">
+                        <c:v>38</c:v>
+                      </c:pt>
+                      <c:pt idx="39">
+                        <c:v>39</c:v>
+                      </c:pt>
+                      <c:pt idx="40">
+                        <c:v>40</c:v>
+                      </c:pt>
+                      <c:pt idx="41">
+                        <c:v>41</c:v>
+                      </c:pt>
+                      <c:pt idx="42">
+                        <c:v>42</c:v>
+                      </c:pt>
+                      <c:pt idx="43">
+                        <c:v>43</c:v>
+                      </c:pt>
+                      <c:pt idx="44">
+                        <c:v>44</c:v>
+                      </c:pt>
+                      <c:pt idx="45">
+                        <c:v>45</c:v>
+                      </c:pt>
+                      <c:pt idx="46">
+                        <c:v>46</c:v>
+                      </c:pt>
+                      <c:pt idx="47">
+                        <c:v>47</c:v>
+                      </c:pt>
+                      <c:pt idx="48">
+                        <c:v>48</c:v>
+                      </c:pt>
+                      <c:pt idx="49">
+                        <c:v>49</c:v>
+                      </c:pt>
+                      <c:pt idx="50">
+                        <c:v>50</c:v>
+                      </c:pt>
+                      <c:pt idx="51">
+                        <c:v>51</c:v>
+                      </c:pt>
+                      <c:pt idx="52">
+                        <c:v>52</c:v>
+                      </c:pt>
+                      <c:pt idx="53">
+                        <c:v>53</c:v>
+                      </c:pt>
+                      <c:pt idx="54">
+                        <c:v>54</c:v>
+                      </c:pt>
+                      <c:pt idx="55">
+                        <c:v>55</c:v>
+                      </c:pt>
+                      <c:pt idx="56">
+                        <c:v>56</c:v>
+                      </c:pt>
+                      <c:pt idx="57">
+                        <c:v>57</c:v>
+                      </c:pt>
+                      <c:pt idx="58">
+                        <c:v>58</c:v>
+                      </c:pt>
+                      <c:pt idx="59">
+                        <c:v>59</c:v>
+                      </c:pt>
+                      <c:pt idx="60">
+                        <c:v>60</c:v>
+                      </c:pt>
+                      <c:pt idx="61">
+                        <c:v>61</c:v>
+                      </c:pt>
+                      <c:pt idx="62">
+                        <c:v>62</c:v>
+                      </c:pt>
+                      <c:pt idx="63">
+                        <c:v>63</c:v>
+                      </c:pt>
+                      <c:pt idx="64">
+                        <c:v>64</c:v>
+                      </c:pt>
+                      <c:pt idx="65">
+                        <c:v>65</c:v>
+                      </c:pt>
+                      <c:pt idx="66">
+                        <c:v>66</c:v>
+                      </c:pt>
+                      <c:pt idx="67">
+                        <c:v>67</c:v>
+                      </c:pt>
+                      <c:pt idx="68">
+                        <c:v>68</c:v>
+                      </c:pt>
+                      <c:pt idx="69">
+                        <c:v>69</c:v>
+                      </c:pt>
+                      <c:pt idx="70">
+                        <c:v>70</c:v>
+                      </c:pt>
+                      <c:pt idx="71">
+                        <c:v>71</c:v>
+                      </c:pt>
+                      <c:pt idx="72">
+                        <c:v>72</c:v>
+                      </c:pt>
+                      <c:pt idx="73">
+                        <c:v>73</c:v>
+                      </c:pt>
+                      <c:pt idx="74">
+                        <c:v>74</c:v>
+                      </c:pt>
+                      <c:pt idx="75">
+                        <c:v>75</c:v>
+                      </c:pt>
+                      <c:pt idx="76">
+                        <c:v>76</c:v>
+                      </c:pt>
+                      <c:pt idx="77">
+                        <c:v>77</c:v>
+                      </c:pt>
+                      <c:pt idx="78">
+                        <c:v>78</c:v>
+                      </c:pt>
+                      <c:pt idx="79">
+                        <c:v>79</c:v>
+                      </c:pt>
+                      <c:pt idx="80">
+                        <c:v>80</c:v>
+                      </c:pt>
+                      <c:pt idx="81">
+                        <c:v>81</c:v>
+                      </c:pt>
+                      <c:pt idx="82">
+                        <c:v>82</c:v>
+                      </c:pt>
+                      <c:pt idx="83">
+                        <c:v>83</c:v>
+                      </c:pt>
+                      <c:pt idx="84">
+                        <c:v>84</c:v>
+                      </c:pt>
+                      <c:pt idx="85">
+                        <c:v>85</c:v>
+                      </c:pt>
+                      <c:pt idx="86">
+                        <c:v>86</c:v>
+                      </c:pt>
+                      <c:pt idx="87">
+                        <c:v>87</c:v>
+                      </c:pt>
+                      <c:pt idx="88">
+                        <c:v>88</c:v>
+                      </c:pt>
+                      <c:pt idx="89">
+                        <c:v>89</c:v>
+                      </c:pt>
+                      <c:pt idx="90">
+                        <c:v>90</c:v>
+                      </c:pt>
+                      <c:pt idx="91">
+                        <c:v>91</c:v>
+                      </c:pt>
+                      <c:pt idx="92">
+                        <c:v>92</c:v>
+                      </c:pt>
+                      <c:pt idx="93">
+                        <c:v>93</c:v>
+                      </c:pt>
+                      <c:pt idx="94">
+                        <c:v>94</c:v>
+                      </c:pt>
+                      <c:pt idx="95">
+                        <c:v>95</c:v>
+                      </c:pt>
+                      <c:pt idx="96">
+                        <c:v>96</c:v>
+                      </c:pt>
+                      <c:pt idx="97">
+                        <c:v>97</c:v>
+                      </c:pt>
+                      <c:pt idx="98">
+                        <c:v>98</c:v>
+                      </c:pt>
+                      <c:pt idx="99">
+                        <c:v>99</c:v>
+                      </c:pt>
+                      <c:pt idx="100">
+                        <c:v>100</c:v>
+                      </c:pt>
+                    </c:numCache>
+                  </c:numRef>
+                </c:val>
+                <c:smooth val="0"/>
+                <c:extLst>
+                  <c:ext xmlns:c16="http://schemas.microsoft.com/office/drawing/2014/chart" uri="{C3380CC4-5D6E-409C-BE32-E72D297353CC}">
+                    <c16:uniqueId val="{00000002-3437-45D7-AF20-005D115F4F58}"/>
+                  </c:ext>
+                </c:extLst>
+              </c15:ser>
+            </c15:filteredLineSeries>
+          </c:ext>
+        </c:extLst>
+      </c:lineChart>
+      <c:catAx>
+        <c:axId val="394856799"/>
+        <c:scaling>
+          <c:orientation val="minMax"/>
+        </c:scaling>
+        <c:delete val="0"/>
+        <c:axPos val="b"/>
+        <c:title>
+          <c:tx>
+            <c:rich>
+              <a:bodyPr rot="0" spcFirstLastPara="1" vertOverflow="ellipsis" vert="horz" wrap="square" anchor="ctr" anchorCtr="1"/>
+              <a:lstStyle/>
+              <a:p>
+                <a:pPr>
+                  <a:defRPr sz="1000" b="0" i="0" u="none" strike="noStrike" kern="1200" baseline="0">
+                    <a:solidFill>
+                      <a:schemeClr val="tx1">
+                        <a:lumMod val="65000"/>
+                        <a:lumOff val="35000"/>
+                      </a:schemeClr>
+                    </a:solidFill>
+                    <a:latin typeface="+mn-lt"/>
+                    <a:ea typeface="+mn-ea"/>
+                    <a:cs typeface="+mn-cs"/>
+                  </a:defRPr>
+                </a:pPr>
+                <a:r>
+                  <a:rPr lang="en-US" sz="1600"/>
+                  <a:t>Generation_num</a:t>
+                </a:r>
+              </a:p>
+            </c:rich>
+          </c:tx>
+          <c:layout/>
+          <c:overlay val="0"/>
+          <c:spPr>
+            <a:noFill/>
+            <a:ln>
+              <a:noFill/>
+            </a:ln>
+            <a:effectLst/>
+          </c:spPr>
+          <c:txPr>
+            <a:bodyPr rot="0" spcFirstLastPara="1" vertOverflow="ellipsis" vert="horz" wrap="square" anchor="ctr" anchorCtr="1"/>
+            <a:lstStyle/>
+            <a:p>
+              <a:pPr>
+                <a:defRPr sz="1000" b="0" i="0" u="none" strike="noStrike" kern="1200" baseline="0">
+                  <a:solidFill>
+                    <a:schemeClr val="tx1">
+                      <a:lumMod val="65000"/>
+                      <a:lumOff val="35000"/>
+                    </a:schemeClr>
+                  </a:solidFill>
+                  <a:latin typeface="+mn-lt"/>
+                  <a:ea typeface="+mn-ea"/>
+                  <a:cs typeface="+mn-cs"/>
+                </a:defRPr>
+              </a:pPr>
+              <a:endParaRPr lang="en-US"/>
+            </a:p>
+          </c:txPr>
+        </c:title>
+        <c:majorTickMark val="none"/>
+        <c:minorTickMark val="none"/>
+        <c:tickLblPos val="nextTo"/>
+        <c:spPr>
+          <a:noFill/>
+          <a:ln w="9525" cap="flat" cmpd="sng" algn="ctr">
+            <a:solidFill>
+              <a:schemeClr val="tx1">
+                <a:lumMod val="15000"/>
+                <a:lumOff val="85000"/>
+              </a:schemeClr>
+            </a:solidFill>
+            <a:round/>
+          </a:ln>
+          <a:effectLst/>
+        </c:spPr>
+        <c:txPr>
+          <a:bodyPr rot="-60000000" spcFirstLastPara="1" vertOverflow="ellipsis" vert="horz" wrap="square" anchor="ctr" anchorCtr="1"/>
+          <a:lstStyle/>
+          <a:p>
+            <a:pPr>
+              <a:defRPr sz="900" b="0" i="0" u="none" strike="noStrike" kern="1200" baseline="0">
+                <a:solidFill>
+                  <a:schemeClr val="tx1">
+                    <a:lumMod val="65000"/>
+                    <a:lumOff val="35000"/>
+                  </a:schemeClr>
+                </a:solidFill>
+                <a:latin typeface="+mn-lt"/>
+                <a:ea typeface="+mn-ea"/>
+                <a:cs typeface="+mn-cs"/>
+              </a:defRPr>
+            </a:pPr>
+            <a:endParaRPr lang="en-US"/>
+          </a:p>
+        </c:txPr>
+        <c:crossAx val="394857215"/>
+        <c:crosses val="autoZero"/>
+        <c:auto val="1"/>
+        <c:lblAlgn val="ctr"/>
+        <c:lblOffset val="100"/>
+        <c:noMultiLvlLbl val="0"/>
+      </c:catAx>
+      <c:valAx>
+        <c:axId val="394857215"/>
+        <c:scaling>
+          <c:orientation val="minMax"/>
+        </c:scaling>
+        <c:delete val="0"/>
+        <c:axPos val="l"/>
+        <c:majorGridlines>
+          <c:spPr>
+            <a:ln w="9525" cap="flat" cmpd="sng" algn="ctr">
+              <a:solidFill>
+                <a:schemeClr val="tx1">
+                  <a:lumMod val="15000"/>
+                  <a:lumOff val="85000"/>
+                </a:schemeClr>
+              </a:solidFill>
+              <a:round/>
+            </a:ln>
+            <a:effectLst/>
+          </c:spPr>
+        </c:majorGridlines>
+        <c:title>
+          <c:tx>
+            <c:rich>
+              <a:bodyPr rot="-5400000" spcFirstLastPara="1" vertOverflow="ellipsis" vert="horz" wrap="square" anchor="ctr" anchorCtr="1"/>
+              <a:lstStyle/>
+              <a:p>
+                <a:pPr>
+                  <a:defRPr sz="1000" b="0" i="0" u="none" strike="noStrike" kern="1200" baseline="0">
+                    <a:solidFill>
+                      <a:schemeClr val="tx1">
+                        <a:lumMod val="65000"/>
+                        <a:lumOff val="35000"/>
+                      </a:schemeClr>
+                    </a:solidFill>
+                    <a:latin typeface="+mn-lt"/>
+                    <a:ea typeface="+mn-ea"/>
+                    <a:cs typeface="+mn-cs"/>
+                  </a:defRPr>
+                </a:pPr>
+                <a:r>
+                  <a:rPr lang="en-US" sz="1600"/>
+                  <a:t>Score</a:t>
+                </a:r>
+              </a:p>
+            </c:rich>
+          </c:tx>
+          <c:layout/>
+          <c:overlay val="0"/>
+          <c:spPr>
+            <a:noFill/>
+            <a:ln>
+              <a:noFill/>
+            </a:ln>
+            <a:effectLst/>
+          </c:spPr>
+          <c:txPr>
+            <a:bodyPr rot="-5400000" spcFirstLastPara="1" vertOverflow="ellipsis" vert="horz" wrap="square" anchor="ctr" anchorCtr="1"/>
+            <a:lstStyle/>
+            <a:p>
+              <a:pPr>
+                <a:defRPr sz="1000" b="0" i="0" u="none" strike="noStrike" kern="1200" baseline="0">
+                  <a:solidFill>
+                    <a:schemeClr val="tx1">
+                      <a:lumMod val="65000"/>
+                      <a:lumOff val="35000"/>
+                    </a:schemeClr>
+                  </a:solidFill>
+                  <a:latin typeface="+mn-lt"/>
+                  <a:ea typeface="+mn-ea"/>
+                  <a:cs typeface="+mn-cs"/>
+                </a:defRPr>
+              </a:pPr>
+              <a:endParaRPr lang="en-US"/>
+            </a:p>
+          </c:txPr>
+        </c:title>
+        <c:numFmt formatCode="General" sourceLinked="1"/>
+        <c:majorTickMark val="none"/>
+        <c:minorTickMark val="none"/>
+        <c:tickLblPos val="nextTo"/>
+        <c:spPr>
+          <a:noFill/>
+          <a:ln>
+            <a:noFill/>
+          </a:ln>
+          <a:effectLst/>
+        </c:spPr>
+        <c:txPr>
+          <a:bodyPr rot="-60000000" spcFirstLastPara="1" vertOverflow="ellipsis" vert="horz" wrap="square" anchor="ctr" anchorCtr="1"/>
+          <a:lstStyle/>
+          <a:p>
+            <a:pPr>
+              <a:defRPr sz="900" b="0" i="0" u="none" strike="noStrike" kern="1200" baseline="0">
+                <a:solidFill>
+                  <a:schemeClr val="tx1">
+                    <a:lumMod val="65000"/>
+                    <a:lumOff val="35000"/>
+                  </a:schemeClr>
+                </a:solidFill>
+                <a:latin typeface="+mn-lt"/>
+                <a:ea typeface="+mn-ea"/>
+                <a:cs typeface="+mn-cs"/>
+              </a:defRPr>
+            </a:pPr>
+            <a:endParaRPr lang="en-US"/>
+          </a:p>
+        </c:txPr>
+        <c:crossAx val="394856799"/>
+        <c:crosses val="autoZero"/>
+        <c:crossBetween val="between"/>
+      </c:valAx>
+      <c:spPr>
+        <a:noFill/>
+        <a:ln>
+          <a:noFill/>
+        </a:ln>
+        <a:effectLst/>
+      </c:spPr>
+    </c:plotArea>
+    <c:legend>
+      <c:legendPos val="r"/>
+      <c:layout/>
+      <c:overlay val="0"/>
+      <c:spPr>
+        <a:noFill/>
+        <a:ln>
+          <a:noFill/>
+        </a:ln>
+        <a:effectLst/>
+      </c:spPr>
+      <c:txPr>
+        <a:bodyPr rot="0" spcFirstLastPara="1" vertOverflow="ellipsis" vert="horz" wrap="square" anchor="ctr" anchorCtr="1"/>
+        <a:lstStyle/>
+        <a:p>
+          <a:pPr>
+            <a:defRPr sz="900" b="0" i="0" u="none" strike="noStrike" kern="1200" baseline="0">
+              <a:solidFill>
+                <a:schemeClr val="tx1">
+                  <a:lumMod val="65000"/>
+                  <a:lumOff val="35000"/>
+                </a:schemeClr>
+              </a:solidFill>
+              <a:latin typeface="+mn-lt"/>
+              <a:ea typeface="+mn-ea"/>
+              <a:cs typeface="+mn-cs"/>
+            </a:defRPr>
+          </a:pPr>
+          <a:endParaRPr lang="en-US"/>
+        </a:p>
+      </c:txPr>
+    </c:legend>
+    <c:plotVisOnly val="1"/>
+    <c:dispBlanksAs val="gap"/>
+    <c:showDLblsOverMax val="0"/>
+  </c:chart>
+  <c:spPr>
+    <a:solidFill>
+      <a:schemeClr val="bg1"/>
+    </a:solidFill>
+    <a:ln>
+      <a:noFill/>
+    </a:ln>
+    <a:effectLst/>
+  </c:spPr>
+  <c:txPr>
+    <a:bodyPr/>
+    <a:lstStyle/>
+    <a:p>
+      <a:pPr>
+        <a:defRPr/>
+      </a:pPr>
+      <a:endParaRPr lang="en-US"/>
+    </a:p>
+  </c:txPr>
+  <c:externalData r:id="rId3">
+    <c:autoUpdate val="0"/>
+  </c:externalData>
+</c:chartSpace>
+</file>
+
+<file path=ppt/charts/colors1.xml><?xml version="1.0" encoding="utf-8"?>
+<cs:colorStyle xmlns:cs="http://schemas.microsoft.com/office/drawing/2012/chartStyle" xmlns:a="http://schemas.openxmlformats.org/drawingml/2006/main" meth="cycle" id="10">
+  <a:schemeClr val="accent1"/>
+  <a:schemeClr val="accent2"/>
+  <a:schemeClr val="accent3"/>
+  <a:schemeClr val="accent4"/>
+  <a:schemeClr val="accent5"/>
+  <a:schemeClr val="accent6"/>
+  <cs:variation/>
+  <cs:variation>
+    <a:lumMod val="60000"/>
+  </cs:variation>
+  <cs:variation>
+    <a:lumMod val="80000"/>
+    <a:lumOff val="20000"/>
+  </cs:variation>
+  <cs:variation>
+    <a:lumMod val="80000"/>
+  </cs:variation>
+  <cs:variation>
+    <a:lumMod val="60000"/>
+    <a:lumOff val="40000"/>
+  </cs:variation>
+  <cs:variation>
+    <a:lumMod val="50000"/>
+  </cs:variation>
+  <cs:variation>
+    <a:lumMod val="70000"/>
+    <a:lumOff val="30000"/>
+  </cs:variation>
+  <cs:variation>
+    <a:lumMod val="70000"/>
+  </cs:variation>
+  <cs:variation>
+    <a:lumMod val="50000"/>
+    <a:lumOff val="50000"/>
+  </cs:variation>
+</cs:colorStyle>
+</file>
+
+<file path=ppt/charts/style1.xml><?xml version="1.0" encoding="utf-8"?>
+<cs:chartStyle xmlns:cs="http://schemas.microsoft.com/office/drawing/2012/chartStyle" xmlns:a="http://schemas.openxmlformats.org/drawingml/2006/main" id="227">
+  <cs:axisTitle>
+    <cs:lnRef idx="0"/>
+    <cs:fillRef idx="0"/>
+    <cs:effectRef idx="0"/>
+    <cs:fontRef idx="minor">
+      <a:schemeClr val="tx1">
+        <a:lumMod val="65000"/>
+        <a:lumOff val="35000"/>
+      </a:schemeClr>
+    </cs:fontRef>
+    <cs:defRPr sz="1000" kern="1200"/>
+  </cs:axisTitle>
+  <cs:categoryAxis>
+    <cs:lnRef idx="0"/>
+    <cs:fillRef idx="0"/>
+    <cs:effectRef idx="0"/>
+    <cs:fontRef idx="minor">
+      <a:schemeClr val="tx1">
+        <a:lumMod val="65000"/>
+        <a:lumOff val="35000"/>
+      </a:schemeClr>
+    </cs:fontRef>
+    <cs:spPr>
+      <a:ln w="9525" cap="flat" cmpd="sng" algn="ctr">
+        <a:solidFill>
+          <a:schemeClr val="tx1">
+            <a:lumMod val="15000"/>
+            <a:lumOff val="85000"/>
+          </a:schemeClr>
+        </a:solidFill>
+        <a:round/>
+      </a:ln>
+    </cs:spPr>
+    <cs:defRPr sz="900" kern="1200"/>
+  </cs:categoryAxis>
+  <cs:chartArea mods="allowNoFillOverride allowNoLineOverride">
+    <cs:lnRef idx="0"/>
+    <cs:fillRef idx="0"/>
+    <cs:effectRef idx="0"/>
+    <cs:fontRef idx="minor">
+      <a:schemeClr val="tx1"/>
+    </cs:fontRef>
+    <cs:spPr>
+      <a:solidFill>
+        <a:schemeClr val="bg1"/>
+      </a:solidFill>
+      <a:ln w="9525" cap="flat" cmpd="sng" algn="ctr">
+        <a:solidFill>
+          <a:schemeClr val="tx1">
+            <a:lumMod val="15000"/>
+            <a:lumOff val="85000"/>
+          </a:schemeClr>
+        </a:solidFill>
+        <a:round/>
+      </a:ln>
+    </cs:spPr>
+    <cs:defRPr sz="1000" kern="1200"/>
+  </cs:chartArea>
+  <cs:dataLabel>
+    <cs:lnRef idx="0"/>
+    <cs:fillRef idx="0"/>
+    <cs:effectRef idx="0"/>
+    <cs:fontRef idx="minor">
+      <a:schemeClr val="tx1">
+        <a:lumMod val="75000"/>
+        <a:lumOff val="25000"/>
+      </a:schemeClr>
+    </cs:fontRef>
+    <cs:defRPr sz="900" kern="1200"/>
+  </cs:dataLabel>
+  <cs:dataLabelCallout>
+    <cs:lnRef idx="0"/>
+    <cs:fillRef idx="0"/>
+    <cs:effectRef idx="0"/>
+    <cs:fontRef idx="minor">
+      <a:schemeClr val="dk1">
+        <a:lumMod val="65000"/>
+        <a:lumOff val="35000"/>
+      </a:schemeClr>
+    </cs:fontRef>
+    <cs:spPr>
+      <a:solidFill>
+        <a:schemeClr val="lt1"/>
+      </a:solidFill>
+      <a:ln>
+        <a:solidFill>
+          <a:schemeClr val="dk1">
+            <a:lumMod val="25000"/>
+            <a:lumOff val="75000"/>
+          </a:schemeClr>
+        </a:solidFill>
+      </a:ln>
+    </cs:spPr>
+    <cs:defRPr sz="900" kern="1200"/>
+    <cs:bodyPr rot="0" spcFirstLastPara="1" vertOverflow="clip" horzOverflow="clip" vert="horz" wrap="square" lIns="36576" tIns="18288" rIns="36576" bIns="18288" anchor="ctr" anchorCtr="1">
+      <a:spAutoFit/>
+    </cs:bodyPr>
+  </cs:dataLabelCallout>
+  <cs:dataPoint>
+    <cs:lnRef idx="0"/>
+    <cs:fillRef idx="1">
+      <cs:styleClr val="auto"/>
+    </cs:fillRef>
+    <cs:effectRef idx="0"/>
+    <cs:fontRef idx="minor">
+      <a:schemeClr val="tx1"/>
+    </cs:fontRef>
+    <cs:spPr>
+      <a:solidFill>
+        <a:schemeClr val="phClr"/>
+      </a:solidFill>
+    </cs:spPr>
+  </cs:dataPoint>
+  <cs:dataPoint3D>
+    <cs:lnRef idx="0"/>
+    <cs:fillRef idx="1">
+      <cs:styleClr val="auto"/>
+    </cs:fillRef>
+    <cs:effectRef idx="0"/>
+    <cs:fontRef idx="minor">
+      <a:schemeClr val="tx1"/>
+    </cs:fontRef>
+    <cs:spPr>
+      <a:solidFill>
+        <a:schemeClr val="phClr"/>
+      </a:solidFill>
+    </cs:spPr>
+  </cs:dataPoint3D>
+  <cs:dataPointLine>
+    <cs:lnRef idx="0">
+      <cs:styleClr val="auto"/>
+    </cs:lnRef>
+    <cs:fillRef idx="1"/>
+    <cs:effectRef idx="0"/>
+    <cs:fontRef idx="minor">
+      <a:schemeClr val="tx1"/>
+    </cs:fontRef>
+    <cs:spPr>
+      <a:ln w="28575" cap="rnd">
+        <a:solidFill>
+          <a:schemeClr val="phClr"/>
+        </a:solidFill>
+        <a:round/>
+      </a:ln>
+    </cs:spPr>
+  </cs:dataPointLine>
+  <cs:dataPointMarker>
+    <cs:lnRef idx="0">
+      <cs:styleClr val="auto"/>
+    </cs:lnRef>
+    <cs:fillRef idx="1">
+      <cs:styleClr val="auto"/>
+    </cs:fillRef>
+    <cs:effectRef idx="0"/>
+    <cs:fontRef idx="minor">
+      <a:schemeClr val="tx1"/>
+    </cs:fontRef>
+    <cs:spPr>
+      <a:solidFill>
+        <a:schemeClr val="phClr"/>
+      </a:solidFill>
+      <a:ln w="9525">
+        <a:solidFill>
+          <a:schemeClr val="phClr"/>
+        </a:solidFill>
+      </a:ln>
+    </cs:spPr>
+  </cs:dataPointMarker>
+  <cs:dataPointMarkerLayout symbol="circle" size="5"/>
+  <cs:dataPointWireframe>
+    <cs:lnRef idx="0">
+      <cs:styleClr val="auto"/>
+    </cs:lnRef>
+    <cs:fillRef idx="1"/>
+    <cs:effectRef idx="0"/>
+    <cs:fontRef idx="minor">
+      <a:schemeClr val="tx1"/>
+    </cs:fontRef>
+    <cs:spPr>
+      <a:ln w="9525" cap="rnd">
+        <a:solidFill>
+          <a:schemeClr val="phClr"/>
+        </a:solidFill>
+        <a:round/>
+      </a:ln>
+    </cs:spPr>
+  </cs:dataPointWireframe>
+  <cs:dataTable>
+    <cs:lnRef idx="0"/>
+    <cs:fillRef idx="0"/>
+    <cs:effectRef idx="0"/>
+    <cs:fontRef idx="minor">
+      <a:schemeClr val="tx1">
+        <a:lumMod val="65000"/>
+        <a:lumOff val="35000"/>
+      </a:schemeClr>
+    </cs:fontRef>
+    <cs:spPr>
+      <a:noFill/>
+      <a:ln w="9525" cap="flat" cmpd="sng" algn="ctr">
+        <a:solidFill>
+          <a:schemeClr val="tx1">
+            <a:lumMod val="15000"/>
+            <a:lumOff val="85000"/>
+          </a:schemeClr>
+        </a:solidFill>
+        <a:round/>
+      </a:ln>
+    </cs:spPr>
+    <cs:defRPr sz="900" kern="1200"/>
+  </cs:dataTable>
+  <cs:downBar>
+    <cs:lnRef idx="0"/>
+    <cs:fillRef idx="0"/>
+    <cs:effectRef idx="0"/>
+    <cs:fontRef idx="minor">
+      <a:schemeClr val="dk1"/>
+    </cs:fontRef>
+    <cs:spPr>
+      <a:solidFill>
+        <a:schemeClr val="dk1">
+          <a:lumMod val="65000"/>
+          <a:lumOff val="35000"/>
+        </a:schemeClr>
+      </a:solidFill>
+      <a:ln w="9525">
+        <a:solidFill>
+          <a:schemeClr val="tx1">
+            <a:lumMod val="65000"/>
+            <a:lumOff val="35000"/>
+          </a:schemeClr>
+        </a:solidFill>
+      </a:ln>
+    </cs:spPr>
+  </cs:downBar>
+  <cs:dropLine>
+    <cs:lnRef idx="0"/>
+    <cs:fillRef idx="0"/>
+    <cs:effectRef idx="0"/>
+    <cs:fontRef idx="minor">
+      <a:schemeClr val="tx1"/>
+    </cs:fontRef>
+    <cs:spPr>
+      <a:ln w="9525" cap="flat" cmpd="sng" algn="ctr">
+        <a:solidFill>
+          <a:schemeClr val="tx1">
+            <a:lumMod val="35000"/>
+            <a:lumOff val="65000"/>
+          </a:schemeClr>
+        </a:solidFill>
+        <a:round/>
+      </a:ln>
+    </cs:spPr>
+  </cs:dropLine>
+  <cs:errorBar>
+    <cs:lnRef idx="0"/>
+    <cs:fillRef idx="0"/>
+    <cs:effectRef idx="0"/>
+    <cs:fontRef idx="minor">
+      <a:schemeClr val="tx1"/>
+    </cs:fontRef>
+    <cs:spPr>
+      <a:ln w="9525" cap="flat" cmpd="sng" algn="ctr">
+        <a:solidFill>
+          <a:schemeClr val="tx1">
+            <a:lumMod val="65000"/>
+            <a:lumOff val="35000"/>
+          </a:schemeClr>
+        </a:solidFill>
+        <a:round/>
+      </a:ln>
+    </cs:spPr>
+  </cs:errorBar>
+  <cs:floor>
+    <cs:lnRef idx="0"/>
+    <cs:fillRef idx="0"/>
+    <cs:effectRef idx="0"/>
+    <cs:fontRef idx="minor">
+      <a:schemeClr val="tx1"/>
+    </cs:fontRef>
+    <cs:spPr>
+      <a:noFill/>
+      <a:ln>
+        <a:noFill/>
+      </a:ln>
+    </cs:spPr>
+  </cs:floor>
+  <cs:gridlineMajor>
+    <cs:lnRef idx="0"/>
+    <cs:fillRef idx="0"/>
+    <cs:effectRef idx="0"/>
+    <cs:fontRef idx="minor">
+      <a:schemeClr val="tx1"/>
+    </cs:fontRef>
+    <cs:spPr>
+      <a:ln w="9525" cap="flat" cmpd="sng" algn="ctr">
+        <a:solidFill>
+          <a:schemeClr val="tx1">
+            <a:lumMod val="15000"/>
+            <a:lumOff val="85000"/>
+          </a:schemeClr>
+        </a:solidFill>
+        <a:round/>
+      </a:ln>
+    </cs:spPr>
+  </cs:gridlineMajor>
+  <cs:gridlineMinor>
+    <cs:lnRef idx="0"/>
+    <cs:fillRef idx="0"/>
+    <cs:effectRef idx="0"/>
+    <cs:fontRef idx="minor">
+      <a:schemeClr val="tx1"/>
+    </cs:fontRef>
+    <cs:spPr>
+      <a:ln w="9525" cap="flat" cmpd="sng" algn="ctr">
+        <a:solidFill>
+          <a:schemeClr val="tx1">
+            <a:lumMod val="5000"/>
+            <a:lumOff val="95000"/>
+          </a:schemeClr>
+        </a:solidFill>
+        <a:round/>
+      </a:ln>
+    </cs:spPr>
+  </cs:gridlineMinor>
+  <cs:hiLoLine>
+    <cs:lnRef idx="0"/>
+    <cs:fillRef idx="0"/>
+    <cs:effectRef idx="0"/>
+    <cs:fontRef idx="minor">
+      <a:schemeClr val="tx1"/>
+    </cs:fontRef>
+    <cs:spPr>
+      <a:ln w="9525" cap="flat" cmpd="sng" algn="ctr">
+        <a:solidFill>
+          <a:schemeClr val="tx1">
+            <a:lumMod val="75000"/>
+            <a:lumOff val="25000"/>
+          </a:schemeClr>
+        </a:solidFill>
+        <a:round/>
+      </a:ln>
+    </cs:spPr>
+  </cs:hiLoLine>
+  <cs:leaderLine>
+    <cs:lnRef idx="0"/>
+    <cs:fillRef idx="0"/>
+    <cs:effectRef idx="0"/>
+    <cs:fontRef idx="minor">
+      <a:schemeClr val="tx1"/>
+    </cs:fontRef>
+    <cs:spPr>
+      <a:ln w="9525" cap="flat" cmpd="sng" algn="ctr">
+        <a:solidFill>
+          <a:schemeClr val="tx1">
+            <a:lumMod val="35000"/>
+            <a:lumOff val="65000"/>
+          </a:schemeClr>
+        </a:solidFill>
+        <a:round/>
+      </a:ln>
+    </cs:spPr>
+  </cs:leaderLine>
+  <cs:legend>
+    <cs:lnRef idx="0"/>
+    <cs:fillRef idx="0"/>
+    <cs:effectRef idx="0"/>
+    <cs:fontRef idx="minor">
+      <a:schemeClr val="tx1">
+        <a:lumMod val="65000"/>
+        <a:lumOff val="35000"/>
+      </a:schemeClr>
+    </cs:fontRef>
+    <cs:defRPr sz="900" kern="1200"/>
+  </cs:legend>
+  <cs:plotArea mods="allowNoFillOverride allowNoLineOverride">
+    <cs:lnRef idx="0"/>
+    <cs:fillRef idx="0"/>
+    <cs:effectRef idx="0"/>
+    <cs:fontRef idx="minor">
+      <a:schemeClr val="tx1"/>
+    </cs:fontRef>
+  </cs:plotArea>
+  <cs:plotArea3D mods="allowNoFillOverride allowNoLineOverride">
+    <cs:lnRef idx="0"/>
+    <cs:fillRef idx="0"/>
+    <cs:effectRef idx="0"/>
+    <cs:fontRef idx="minor">
+      <a:schemeClr val="tx1"/>
+    </cs:fontRef>
+  </cs:plotArea3D>
+  <cs:seriesAxis>
+    <cs:lnRef idx="0"/>
+    <cs:fillRef idx="0"/>
+    <cs:effectRef idx="0"/>
+    <cs:fontRef idx="minor">
+      <a:schemeClr val="tx1">
+        <a:lumMod val="65000"/>
+        <a:lumOff val="35000"/>
+      </a:schemeClr>
+    </cs:fontRef>
+    <cs:defRPr sz="900" kern="1200"/>
+  </cs:seriesAxis>
+  <cs:seriesLine>
+    <cs:lnRef idx="0"/>
+    <cs:fillRef idx="0"/>
+    <cs:effectRef idx="0"/>
+    <cs:fontRef idx="minor">
+      <a:schemeClr val="tx1"/>
+    </cs:fontRef>
+    <cs:spPr>
+      <a:ln w="9525" cap="flat" cmpd="sng" algn="ctr">
+        <a:solidFill>
+          <a:schemeClr val="tx1">
+            <a:lumMod val="35000"/>
+            <a:lumOff val="65000"/>
+          </a:schemeClr>
+        </a:solidFill>
+        <a:round/>
+      </a:ln>
+    </cs:spPr>
+  </cs:seriesLine>
+  <cs:title>
+    <cs:lnRef idx="0"/>
+    <cs:fillRef idx="0"/>
+    <cs:effectRef idx="0"/>
+    <cs:fontRef idx="minor">
+      <a:schemeClr val="tx1">
+        <a:lumMod val="65000"/>
+        <a:lumOff val="35000"/>
+      </a:schemeClr>
+    </cs:fontRef>
+    <cs:defRPr sz="1400" b="0" kern="1200" spc="0" baseline="0"/>
+  </cs:title>
+  <cs:trendline>
+    <cs:lnRef idx="0">
+      <cs:styleClr val="auto"/>
+    </cs:lnRef>
+    <cs:fillRef idx="0"/>
+    <cs:effectRef idx="0"/>
+    <cs:fontRef idx="minor">
+      <a:schemeClr val="tx1"/>
+    </cs:fontRef>
+    <cs:spPr>
+      <a:ln w="19050" cap="rnd">
+        <a:solidFill>
+          <a:schemeClr val="phClr"/>
+        </a:solidFill>
+        <a:prstDash val="sysDot"/>
+      </a:ln>
+    </cs:spPr>
+  </cs:trendline>
+  <cs:trendlineLabel>
+    <cs:lnRef idx="0"/>
+    <cs:fillRef idx="0"/>
+    <cs:effectRef idx="0"/>
+    <cs:fontRef idx="minor">
+      <a:schemeClr val="tx1">
+        <a:lumMod val="65000"/>
+        <a:lumOff val="35000"/>
+      </a:schemeClr>
+    </cs:fontRef>
+    <cs:defRPr sz="900" kern="1200"/>
+  </cs:trendlineLabel>
+  <cs:upBar>
+    <cs:lnRef idx="0"/>
+    <cs:fillRef idx="0"/>
+    <cs:effectRef idx="0"/>
+    <cs:fontRef idx="minor">
+      <a:schemeClr val="dk1"/>
+    </cs:fontRef>
+    <cs:spPr>
+      <a:solidFill>
+        <a:schemeClr val="lt1"/>
+      </a:solidFill>
+      <a:ln w="9525">
+        <a:solidFill>
+          <a:schemeClr val="tx1">
+            <a:lumMod val="15000"/>
+            <a:lumOff val="85000"/>
+          </a:schemeClr>
+        </a:solidFill>
+      </a:ln>
+    </cs:spPr>
+  </cs:upBar>
+  <cs:valueAxis>
+    <cs:lnRef idx="0"/>
+    <cs:fillRef idx="0"/>
+    <cs:effectRef idx="0"/>
+    <cs:fontRef idx="minor">
+      <a:schemeClr val="tx1">
+        <a:lumMod val="65000"/>
+        <a:lumOff val="35000"/>
+      </a:schemeClr>
+    </cs:fontRef>
+    <cs:defRPr sz="900" kern="1200"/>
+  </cs:valueAxis>
+  <cs:wall>
+    <cs:lnRef idx="0"/>
+    <cs:fillRef idx="0"/>
+    <cs:effectRef idx="0"/>
+    <cs:fontRef idx="minor">
+      <a:schemeClr val="tx1"/>
+    </cs:fontRef>
+    <cs:spPr>
+      <a:noFill/>
+      <a:ln>
+        <a:noFill/>
+      </a:ln>
+    </cs:spPr>
+  </cs:wall>
+</cs:chartStyle>
+</file>
+
 <file path=ppt/notesMasters/notesMaster1.xml><?xml version="1.0" encoding="utf-8"?>
 <p:notesMaster xmlns:a="http://schemas.openxmlformats.org/drawingml/2006/main" xmlns:r="http://schemas.openxmlformats.org/officeDocument/2006/relationships" xmlns:p="http://schemas.openxmlformats.org/presentationml/2006/main">
   <p:cSld>
@@ -231,7 +2500,7 @@
             <a:fld id="{555AB46F-D0DD-4299-A227-5787DFAC4E78}" type="datetimeFigureOut">
               <a:rPr lang="he-IL" smtClean="0"/>
               <a:pPr/>
-              <a:t>כ"ו/טבת/תשע"ט</a:t>
+              <a:t>א'/שבט/תשע"ט</a:t>
             </a:fld>
             <a:endParaRPr lang="he-IL"/>
           </a:p>
@@ -843,7 +3112,7 @@
             <a:fld id="{0BAAA6C0-FC25-41E4-8636-655D3F15062E}" type="datetimeFigureOut">
               <a:rPr lang="he-IL" smtClean="0"/>
               <a:pPr/>
-              <a:t>כ"ו/טבת/תשע"ט</a:t>
+              <a:t>א'/שבט/תשע"ט</a:t>
             </a:fld>
             <a:endParaRPr lang="he-IL"/>
           </a:p>
@@ -1010,7 +3279,7 @@
             <a:fld id="{0BAAA6C0-FC25-41E4-8636-655D3F15062E}" type="datetimeFigureOut">
               <a:rPr lang="he-IL" smtClean="0"/>
               <a:pPr/>
-              <a:t>כ"ו/טבת/תשע"ט</a:t>
+              <a:t>א'/שבט/תשע"ט</a:t>
             </a:fld>
             <a:endParaRPr lang="he-IL"/>
           </a:p>
@@ -1187,7 +3456,7 @@
             <a:fld id="{0BAAA6C0-FC25-41E4-8636-655D3F15062E}" type="datetimeFigureOut">
               <a:rPr lang="he-IL" smtClean="0"/>
               <a:pPr/>
-              <a:t>כ"ו/טבת/תשע"ט</a:t>
+              <a:t>א'/שבט/תשע"ט</a:t>
             </a:fld>
             <a:endParaRPr lang="he-IL"/>
           </a:p>
@@ -1354,7 +3623,7 @@
             <a:fld id="{0BAAA6C0-FC25-41E4-8636-655D3F15062E}" type="datetimeFigureOut">
               <a:rPr lang="he-IL" smtClean="0"/>
               <a:pPr/>
-              <a:t>כ"ו/טבת/תשע"ט</a:t>
+              <a:t>א'/שבט/תשע"ט</a:t>
             </a:fld>
             <a:endParaRPr lang="he-IL"/>
           </a:p>
@@ -1597,7 +3866,7 @@
             <a:fld id="{0BAAA6C0-FC25-41E4-8636-655D3F15062E}" type="datetimeFigureOut">
               <a:rPr lang="he-IL" smtClean="0"/>
               <a:pPr/>
-              <a:t>כ"ו/טבת/תשע"ט</a:t>
+              <a:t>א'/שבט/תשע"ט</a:t>
             </a:fld>
             <a:endParaRPr lang="he-IL"/>
           </a:p>
@@ -1882,7 +4151,7 @@
             <a:fld id="{0BAAA6C0-FC25-41E4-8636-655D3F15062E}" type="datetimeFigureOut">
               <a:rPr lang="he-IL" smtClean="0"/>
               <a:pPr/>
-              <a:t>כ"ו/טבת/תשע"ט</a:t>
+              <a:t>א'/שבט/תשע"ט</a:t>
             </a:fld>
             <a:endParaRPr lang="he-IL"/>
           </a:p>
@@ -2306,7 +4575,7 @@
             <a:fld id="{0BAAA6C0-FC25-41E4-8636-655D3F15062E}" type="datetimeFigureOut">
               <a:rPr lang="he-IL" smtClean="0"/>
               <a:pPr/>
-              <a:t>כ"ו/טבת/תשע"ט</a:t>
+              <a:t>א'/שבט/תשע"ט</a:t>
             </a:fld>
             <a:endParaRPr lang="he-IL"/>
           </a:p>
@@ -2421,7 +4690,7 @@
             <a:fld id="{0BAAA6C0-FC25-41E4-8636-655D3F15062E}" type="datetimeFigureOut">
               <a:rPr lang="he-IL" smtClean="0"/>
               <a:pPr/>
-              <a:t>כ"ו/טבת/תשע"ט</a:t>
+              <a:t>א'/שבט/תשע"ט</a:t>
             </a:fld>
             <a:endParaRPr lang="he-IL"/>
           </a:p>
@@ -2513,7 +4782,7 @@
             <a:fld id="{0BAAA6C0-FC25-41E4-8636-655D3F15062E}" type="datetimeFigureOut">
               <a:rPr lang="he-IL" smtClean="0"/>
               <a:pPr/>
-              <a:t>כ"ו/טבת/תשע"ט</a:t>
+              <a:t>א'/שבט/תשע"ט</a:t>
             </a:fld>
             <a:endParaRPr lang="he-IL"/>
           </a:p>
@@ -2787,7 +5056,7 @@
             <a:fld id="{0BAAA6C0-FC25-41E4-8636-655D3F15062E}" type="datetimeFigureOut">
               <a:rPr lang="he-IL" smtClean="0"/>
               <a:pPr/>
-              <a:t>כ"ו/טבת/תשע"ט</a:t>
+              <a:t>א'/שבט/תשע"ט</a:t>
             </a:fld>
             <a:endParaRPr lang="he-IL"/>
           </a:p>
@@ -3037,7 +5306,7 @@
             <a:fld id="{0BAAA6C0-FC25-41E4-8636-655D3F15062E}" type="datetimeFigureOut">
               <a:rPr lang="he-IL" smtClean="0"/>
               <a:pPr/>
-              <a:t>כ"ו/טבת/תשע"ט</a:t>
+              <a:t>א'/שבט/תשע"ט</a:t>
             </a:fld>
             <a:endParaRPr lang="he-IL"/>
           </a:p>
@@ -3247,7 +5516,7 @@
             <a:fld id="{0BAAA6C0-FC25-41E4-8636-655D3F15062E}" type="datetimeFigureOut">
               <a:rPr lang="he-IL" smtClean="0"/>
               <a:pPr/>
-              <a:t>כ"ו/טבת/תשע"ט</a:t>
+              <a:t>א'/שבט/תשע"ט</a:t>
             </a:fld>
             <a:endParaRPr lang="he-IL"/>
           </a:p>
@@ -3846,6 +6115,315 @@
 </p:sld>
 </file>
 
+<file path=ppt/slides/slide10.xml><?xml version="1.0" encoding="utf-8"?>
+<p:sld xmlns:a="http://schemas.openxmlformats.org/drawingml/2006/main" xmlns:r="http://schemas.openxmlformats.org/officeDocument/2006/relationships" xmlns:p="http://schemas.openxmlformats.org/presentationml/2006/main">
+  <p:cSld>
+    <p:bg>
+      <p:bgPr>
+        <a:solidFill>
+          <a:schemeClr val="tx1"/>
+        </a:solidFill>
+        <a:effectLst/>
+      </p:bgPr>
+    </p:bg>
+    <p:spTree>
+      <p:nvGrpSpPr>
+        <p:cNvPr id="1" name=""/>
+        <p:cNvGrpSpPr/>
+        <p:nvPr/>
+      </p:nvGrpSpPr>
+      <p:grpSpPr>
+        <a:xfrm>
+          <a:off x="0" y="0"/>
+          <a:ext cx="0" cy="0"/>
+          <a:chOff x="0" y="0"/>
+          <a:chExt cx="0" cy="0"/>
+        </a:xfrm>
+      </p:grpSpPr>
+      <p:sp>
+        <p:nvSpPr>
+          <p:cNvPr id="2" name="כותרת 1"/>
+          <p:cNvSpPr>
+            <a:spLocks noGrp="1"/>
+          </p:cNvSpPr>
+          <p:nvPr>
+            <p:ph type="title"/>
+          </p:nvPr>
+        </p:nvSpPr>
+        <p:spPr/>
+        <p:txBody>
+          <a:bodyPr>
+            <a:noAutofit/>
+          </a:bodyPr>
+          <a:lstStyle/>
+          <a:p>
+            <a:r>
+              <a:rPr lang="en-US" dirty="0" smtClean="0">
+                <a:solidFill>
+                  <a:schemeClr val="bg1">
+                    <a:lumMod val="85000"/>
+                  </a:schemeClr>
+                </a:solidFill>
+                <a:latin typeface="Arial" pitchFamily="34" charset="0"/>
+                <a:cs typeface="Arial" pitchFamily="34" charset="0"/>
+              </a:rPr>
+              <a:t>FITNESS FUNCTION</a:t>
+            </a:r>
+            <a:endParaRPr lang="he-IL" dirty="0">
+              <a:solidFill>
+                <a:schemeClr val="bg1">
+                  <a:lumMod val="85000"/>
+                </a:schemeClr>
+              </a:solidFill>
+              <a:latin typeface="Arial" pitchFamily="34" charset="0"/>
+              <a:cs typeface="Arial" pitchFamily="34" charset="0"/>
+            </a:endParaRPr>
+          </a:p>
+        </p:txBody>
+      </p:sp>
+      <p:pic>
+        <p:nvPicPr>
+          <p:cNvPr id="10" name="מציין מיקום תוכן 9" descr="fireworkbig-1.jpg"/>
+          <p:cNvPicPr>
+            <a:picLocks noGrp="1" noChangeAspect="1"/>
+          </p:cNvPicPr>
+          <p:nvPr>
+            <p:ph idx="1"/>
+          </p:nvPr>
+        </p:nvPicPr>
+        <p:blipFill>
+          <a:blip r:embed="rId2" cstate="print"/>
+          <a:stretch>
+            <a:fillRect/>
+          </a:stretch>
+        </p:blipFill>
+        <p:spPr>
+          <a:xfrm>
+            <a:off x="7358082" y="-17"/>
+            <a:ext cx="1785950" cy="1181176"/>
+          </a:xfrm>
+        </p:spPr>
+      </p:pic>
+      <p:pic>
+        <p:nvPicPr>
+          <p:cNvPr id="12" name="מציין מיקום תוכן 9" descr="fireworkbig-1.jpg"/>
+          <p:cNvPicPr>
+            <a:picLocks noChangeAspect="1"/>
+          </p:cNvPicPr>
+          <p:nvPr/>
+        </p:nvPicPr>
+        <p:blipFill>
+          <a:blip r:embed="rId2" cstate="print"/>
+          <a:stretch>
+            <a:fillRect/>
+          </a:stretch>
+        </p:blipFill>
+        <p:spPr>
+          <a:xfrm>
+            <a:off x="-32" y="-18"/>
+            <a:ext cx="1785950" cy="1181176"/>
+          </a:xfrm>
+          <a:prstGeom prst="rect">
+            <a:avLst/>
+          </a:prstGeom>
+        </p:spPr>
+      </p:pic>
+      <p:pic>
+        <p:nvPicPr>
+          <p:cNvPr id="14" name="תמונה 13" descr="images (4).jpg"/>
+          <p:cNvPicPr>
+            <a:picLocks noChangeAspect="1"/>
+          </p:cNvPicPr>
+          <p:nvPr/>
+        </p:nvPicPr>
+        <p:blipFill>
+          <a:blip r:embed="rId3"/>
+          <a:srcRect l="20199" r="17715"/>
+          <a:stretch>
+            <a:fillRect/>
+          </a:stretch>
+        </p:blipFill>
+        <p:spPr>
+          <a:xfrm>
+            <a:off x="8143900" y="1142990"/>
+            <a:ext cx="1000132" cy="890778"/>
+          </a:xfrm>
+          <a:prstGeom prst="rect">
+            <a:avLst/>
+          </a:prstGeom>
+        </p:spPr>
+      </p:pic>
+      <p:pic>
+        <p:nvPicPr>
+          <p:cNvPr id="15" name="תמונה 14" descr="images (4).jpg"/>
+          <p:cNvPicPr>
+            <a:picLocks noChangeAspect="1"/>
+          </p:cNvPicPr>
+          <p:nvPr/>
+        </p:nvPicPr>
+        <p:blipFill>
+          <a:blip r:embed="rId3"/>
+          <a:srcRect l="20199" r="17715"/>
+          <a:stretch>
+            <a:fillRect/>
+          </a:stretch>
+        </p:blipFill>
+        <p:spPr>
+          <a:xfrm>
+            <a:off x="-32" y="1071552"/>
+            <a:ext cx="1000132" cy="890778"/>
+          </a:xfrm>
+          <a:prstGeom prst="rect">
+            <a:avLst/>
+          </a:prstGeom>
+        </p:spPr>
+      </p:pic>
+      <p:sp>
+        <p:nvSpPr>
+          <p:cNvPr id="7" name="TextBox 6"/>
+          <p:cNvSpPr txBox="1"/>
+          <p:nvPr/>
+        </p:nvSpPr>
+        <p:spPr>
+          <a:xfrm>
+            <a:off x="1000100" y="1071553"/>
+            <a:ext cx="7215238" cy="2246769"/>
+          </a:xfrm>
+          <a:prstGeom prst="rect">
+            <a:avLst/>
+          </a:prstGeom>
+          <a:noFill/>
+        </p:spPr>
+        <p:txBody>
+          <a:bodyPr wrap="square" rtlCol="1">
+            <a:spAutoFit/>
+          </a:bodyPr>
+          <a:lstStyle/>
+          <a:p>
+            <a:pPr algn="l" rtl="0">
+              <a:buFont typeface="Arial" pitchFamily="34" charset="0"/>
+              <a:buChar char="•"/>
+            </a:pPr>
+            <a:endParaRPr lang="en-US" sz="2000" dirty="0" smtClean="0">
+              <a:solidFill>
+                <a:schemeClr val="bg1">
+                  <a:lumMod val="85000"/>
+                </a:schemeClr>
+              </a:solidFill>
+            </a:endParaRPr>
+          </a:p>
+          <a:p>
+            <a:pPr lvl="1" algn="l" rtl="0">
+              <a:buFont typeface="Arial" pitchFamily="34" charset="0"/>
+              <a:buChar char="•"/>
+            </a:pPr>
+            <a:endParaRPr lang="en-US" sz="2000" dirty="0" smtClean="0">
+              <a:solidFill>
+                <a:schemeClr val="bg1">
+                  <a:lumMod val="85000"/>
+                </a:schemeClr>
+              </a:solidFill>
+            </a:endParaRPr>
+          </a:p>
+          <a:p>
+            <a:pPr lvl="1" algn="l" rtl="0"/>
+            <a:endParaRPr lang="en-US" sz="2000" dirty="0" smtClean="0">
+              <a:solidFill>
+                <a:schemeClr val="bg1">
+                  <a:lumMod val="85000"/>
+                </a:schemeClr>
+              </a:solidFill>
+            </a:endParaRPr>
+          </a:p>
+          <a:p>
+            <a:pPr lvl="1" algn="l" rtl="0"/>
+            <a:endParaRPr lang="en-US" sz="2000" dirty="0" smtClean="0">
+              <a:solidFill>
+                <a:schemeClr val="bg1">
+                  <a:lumMod val="85000"/>
+                </a:schemeClr>
+              </a:solidFill>
+            </a:endParaRPr>
+          </a:p>
+          <a:p>
+            <a:pPr lvl="1" algn="l" rtl="0"/>
+            <a:endParaRPr lang="en-US" sz="2000" dirty="0" smtClean="0">
+              <a:solidFill>
+                <a:schemeClr val="bg1">
+                  <a:lumMod val="85000"/>
+                </a:schemeClr>
+              </a:solidFill>
+            </a:endParaRPr>
+          </a:p>
+          <a:p>
+            <a:pPr lvl="1" algn="l" rtl="0"/>
+            <a:endParaRPr lang="en-US" sz="2000" dirty="0" smtClean="0">
+              <a:solidFill>
+                <a:schemeClr val="bg1">
+                  <a:lumMod val="85000"/>
+                </a:schemeClr>
+              </a:solidFill>
+            </a:endParaRPr>
+          </a:p>
+          <a:p>
+            <a:pPr lvl="1" algn="l" rtl="0">
+              <a:buFont typeface="Arial" pitchFamily="34" charset="0"/>
+              <a:buChar char="•"/>
+            </a:pPr>
+            <a:endParaRPr lang="en-US" sz="2000" dirty="0" smtClean="0">
+              <a:solidFill>
+                <a:schemeClr val="bg1">
+                  <a:lumMod val="85000"/>
+                </a:schemeClr>
+              </a:solidFill>
+            </a:endParaRPr>
+          </a:p>
+        </p:txBody>
+      </p:sp>
+      <p:graphicFrame>
+        <p:nvGraphicFramePr>
+          <p:cNvPr id="9" name="Chart 8"/>
+          <p:cNvGraphicFramePr>
+            <a:graphicFrameLocks/>
+          </p:cNvGraphicFramePr>
+          <p:nvPr>
+            <p:extLst>
+              <p:ext uri="{D42A27DB-BD31-4B8C-83A1-F6EECF244321}">
+                <p14:modId xmlns:p14="http://schemas.microsoft.com/office/powerpoint/2010/main" val="1299560986"/>
+              </p:ext>
+            </p:extLst>
+          </p:nvPr>
+        </p:nvGraphicFramePr>
+        <p:xfrm>
+          <a:off x="619125" y="483518"/>
+          <a:ext cx="7265243" cy="4621882"/>
+        </p:xfrm>
+        <a:graphic>
+          <a:graphicData uri="http://schemas.openxmlformats.org/drawingml/2006/chart">
+            <c:chart xmlns:c="http://schemas.openxmlformats.org/drawingml/2006/chart" xmlns:r="http://schemas.openxmlformats.org/officeDocument/2006/relationships" r:id="rId4"/>
+          </a:graphicData>
+        </a:graphic>
+      </p:graphicFrame>
+    </p:spTree>
+    <p:extLst>
+      <p:ext uri="{BB962C8B-B14F-4D97-AF65-F5344CB8AC3E}">
+        <p14:creationId xmlns:p14="http://schemas.microsoft.com/office/powerpoint/2010/main" val="1382359092"/>
+      </p:ext>
+    </p:extLst>
+  </p:cSld>
+  <p:clrMapOvr>
+    <a:masterClrMapping/>
+  </p:clrMapOvr>
+  <p:timing>
+    <p:tnLst>
+      <p:par>
+        <p:cTn id="1" dur="indefinite" restart="never" nodeType="tmRoot"/>
+      </p:par>
+    </p:tnLst>
+  </p:timing>
+</p:sld>
+</file>
+
 <file path=ppt/slides/slide2.xml><?xml version="1.0" encoding="utf-8"?>
 <p:sld xmlns:a="http://schemas.openxmlformats.org/drawingml/2006/main" xmlns:r="http://schemas.openxmlformats.org/officeDocument/2006/relationships" xmlns:p="http://schemas.openxmlformats.org/presentationml/2006/main">
   <p:cSld>
@@ -4716,27 +7294,7 @@
                   </a:schemeClr>
                 </a:solidFill>
               </a:rPr>
-              <a:t> game </a:t>
-            </a:r>
-            <a:r>
-              <a:rPr lang="en-US" sz="2000" b="1" dirty="0" smtClean="0">
-                <a:solidFill>
-                  <a:schemeClr val="bg1">
-                    <a:lumMod val="85000"/>
-                  </a:schemeClr>
-                </a:solidFill>
-              </a:rPr>
-              <a:t>was proven</a:t>
-            </a:r>
-            <a:r>
-              <a:rPr lang="en-US" sz="2000" b="1" dirty="0" smtClean="0">
-                <a:solidFill>
-                  <a:schemeClr val="bg1">
-                    <a:lumMod val="85000"/>
-                  </a:schemeClr>
-                </a:solidFill>
-              </a:rPr>
-              <a:t> to be NP-complete (even for cheaters who look at their cards)**.</a:t>
+              <a:t> game was proven to be NP-complete (even for cheaters who look at their cards)**.</a:t>
             </a:r>
           </a:p>
           <a:p>
@@ -5153,25 +7711,8 @@
                   </a:schemeClr>
                 </a:solidFill>
               </a:rPr>
-              <a:t>Evolving Agents for the Hanabi 2018 CIG </a:t>
-            </a:r>
-            <a:r>
-              <a:rPr lang="en-US" b="1" dirty="0" smtClean="0">
-                <a:solidFill>
-                  <a:schemeClr val="bg1">
-                    <a:lumMod val="85000"/>
-                  </a:schemeClr>
-                </a:solidFill>
-              </a:rPr>
-              <a:t>Competition**</a:t>
-            </a:r>
-            <a:endParaRPr lang="en-US" b="1" dirty="0" smtClean="0">
-              <a:solidFill>
-                <a:schemeClr val="bg1">
-                  <a:lumMod val="85000"/>
-                </a:schemeClr>
-              </a:solidFill>
-            </a:endParaRPr>
+              <a:t>Evolving Agents for the Hanabi 2018 CIG Competition**</a:t>
+            </a:r>
           </a:p>
           <a:p>
             <a:pPr lvl="1" algn="l" rtl="0">
@@ -5186,17 +7727,7 @@
                   </a:schemeClr>
                 </a:solidFill>
               </a:rPr>
-              <a:t>In </a:t>
-            </a:r>
-            <a:r>
-              <a:rPr lang="en-US" dirty="0" smtClean="0">
-                <a:solidFill>
-                  <a:schemeClr val="bg1">
-                    <a:lumMod val="85000"/>
-                  </a:schemeClr>
-                </a:solidFill>
-              </a:rPr>
-              <a:t>this paper:</a:t>
+              <a:t>In this paper:</a:t>
             </a:r>
           </a:p>
           <a:p>
@@ -6235,17 +8766,7 @@
                   </a:schemeClr>
                 </a:solidFill>
               </a:rPr>
-              <a:t>A </a:t>
-            </a:r>
-            <a:r>
-              <a:rPr lang="en-US" dirty="0" smtClean="0">
-                <a:solidFill>
-                  <a:schemeClr val="bg1">
-                    <a:lumMod val="85000"/>
-                  </a:schemeClr>
-                </a:solidFill>
-              </a:rPr>
-              <a:t>description of </a:t>
+              <a:t>A description of </a:t>
             </a:r>
             <a:r>
               <a:rPr lang="en-US" dirty="0" err="1" smtClean="0">

</xml_diff>